<commit_message>
Finished Activity 5 report
</commit_message>
<xml_diff>
--- a/05 Video Processing/Activity 5 - Video Processing.pptx
+++ b/05 Video Processing/Activity 5 - Video Processing.pptx
@@ -5742,7 +5742,7 @@
         <p:fade/>
       </p:transition>
     </mc:Choice>
-    <mc:Fallback xmlns:ahyp="http://schemas.microsoft.com/office/drawing/2018/hyperlinkcolor" xmlns:p15="http://schemas.microsoft.com/office/powerpoint/2012/main" xmlns:com="http://schemas.openxmlformats.org/drawingml/2006/compatibility" xmlns:pvml="urn:schemas-microsoft-com:office:powerpoint" xmlns:v="urn:schemas-microsoft-com:vml" xmlns:o="urn:schemas-microsoft-com:office:office" xmlns:dgm="http://schemas.openxmlformats.org/drawingml/2006/diagram" xmlns:c="http://schemas.openxmlformats.org/drawingml/2006/chart" xmlns:mv="urn:schemas-microsoft-com:mac:vml" xmlns="">
+    <mc:Fallback xmlns="" xmlns:mv="urn:schemas-microsoft-com:mac:vml" xmlns:c="http://schemas.openxmlformats.org/drawingml/2006/chart" xmlns:dgm="http://schemas.openxmlformats.org/drawingml/2006/diagram" xmlns:o="urn:schemas-microsoft-com:office:office" xmlns:v="urn:schemas-microsoft-com:vml" xmlns:pvml="urn:schemas-microsoft-com:office:powerpoint" xmlns:com="http://schemas.openxmlformats.org/drawingml/2006/compatibility" xmlns:p15="http://schemas.microsoft.com/office/powerpoint/2012/main" xmlns:ahyp="http://schemas.microsoft.com/office/drawing/2018/hyperlinkcolor">
       <p:transition>
         <p:fade/>
       </p:transition>
@@ -7051,7 +7051,7 @@
         <p:fade/>
       </p:transition>
     </mc:Choice>
-    <mc:Fallback xmlns="" xmlns:mv="urn:schemas-microsoft-com:mac:vml" xmlns:c="http://schemas.openxmlformats.org/drawingml/2006/chart" xmlns:dgm="http://schemas.openxmlformats.org/drawingml/2006/diagram" xmlns:o="urn:schemas-microsoft-com:office:office" xmlns:v="urn:schemas-microsoft-com:vml" xmlns:pvml="urn:schemas-microsoft-com:office:powerpoint" xmlns:com="http://schemas.openxmlformats.org/drawingml/2006/compatibility" xmlns:p15="http://schemas.microsoft.com/office/powerpoint/2012/main" xmlns:ahyp="http://schemas.microsoft.com/office/drawing/2018/hyperlinkcolor">
+    <mc:Fallback xmlns:ahyp="http://schemas.microsoft.com/office/drawing/2018/hyperlinkcolor" xmlns:p15="http://schemas.microsoft.com/office/powerpoint/2012/main" xmlns:com="http://schemas.openxmlformats.org/drawingml/2006/compatibility" xmlns:pvml="urn:schemas-microsoft-com:office:powerpoint" xmlns:v="urn:schemas-microsoft-com:vml" xmlns:o="urn:schemas-microsoft-com:office:office" xmlns:dgm="http://schemas.openxmlformats.org/drawingml/2006/diagram" xmlns:c="http://schemas.openxmlformats.org/drawingml/2006/chart" xmlns:mv="urn:schemas-microsoft-com:mac:vml" xmlns="">
       <p:transition>
         <p:fade/>
       </p:transition>
@@ -8127,7 +8127,7 @@
         <p:fade/>
       </p:transition>
     </mc:Choice>
-    <mc:Fallback xmlns="" xmlns:mv="urn:schemas-microsoft-com:mac:vml" xmlns:c="http://schemas.openxmlformats.org/drawingml/2006/chart" xmlns:dgm="http://schemas.openxmlformats.org/drawingml/2006/diagram" xmlns:o="urn:schemas-microsoft-com:office:office" xmlns:v="urn:schemas-microsoft-com:vml" xmlns:pvml="urn:schemas-microsoft-com:office:powerpoint" xmlns:com="http://schemas.openxmlformats.org/drawingml/2006/compatibility" xmlns:p15="http://schemas.microsoft.com/office/powerpoint/2012/main" xmlns:ahyp="http://schemas.microsoft.com/office/drawing/2018/hyperlinkcolor">
+    <mc:Fallback xmlns:ahyp="http://schemas.microsoft.com/office/drawing/2018/hyperlinkcolor" xmlns:p15="http://schemas.microsoft.com/office/powerpoint/2012/main" xmlns:com="http://schemas.openxmlformats.org/drawingml/2006/compatibility" xmlns:pvml="urn:schemas-microsoft-com:office:powerpoint" xmlns:v="urn:schemas-microsoft-com:vml" xmlns:o="urn:schemas-microsoft-com:office:office" xmlns:dgm="http://schemas.openxmlformats.org/drawingml/2006/diagram" xmlns:c="http://schemas.openxmlformats.org/drawingml/2006/chart" xmlns:mv="urn:schemas-microsoft-com:mac:vml" xmlns="">
       <p:transition>
         <p:fade/>
       </p:transition>
@@ -10243,6 +10243,19 @@
             <a:endParaRPr lang="en-US" dirty="0"/>
           </a:p>
           <a:p>
+            <a:r>
+              <a:rPr lang="en-US" dirty="0"/>
+              <a:t>[5] </a:t>
+            </a:r>
+            <a:r>
+              <a:rPr lang="en-US" dirty="0">
+                <a:hlinkClick r:id="rId4"/>
+              </a:rPr>
+              <a:t>Basic Video Processing (rlprincipe.wixsite.com)</a:t>
+            </a:r>
+            <a:endParaRPr lang="en-US" dirty="0"/>
+          </a:p>
+          <a:p>
             <a:endParaRPr lang="en-US" dirty="0"/>
           </a:p>
         </p:txBody>
@@ -10263,7 +10276,7 @@
         <p:fade/>
       </p:transition>
     </mc:Choice>
-    <mc:Fallback xmlns="" xmlns:mv="urn:schemas-microsoft-com:mac:vml" xmlns:c="http://schemas.openxmlformats.org/drawingml/2006/chart" xmlns:dgm="http://schemas.openxmlformats.org/drawingml/2006/diagram" xmlns:o="urn:schemas-microsoft-com:office:office" xmlns:v="urn:schemas-microsoft-com:vml" xmlns:pvml="urn:schemas-microsoft-com:office:powerpoint" xmlns:com="http://schemas.openxmlformats.org/drawingml/2006/compatibility" xmlns:p15="http://schemas.microsoft.com/office/powerpoint/2012/main" xmlns:ahyp="http://schemas.microsoft.com/office/drawing/2018/hyperlinkcolor">
+    <mc:Fallback xmlns:ahyp="http://schemas.microsoft.com/office/drawing/2018/hyperlinkcolor" xmlns:p15="http://schemas.microsoft.com/office/powerpoint/2012/main" xmlns:com="http://schemas.openxmlformats.org/drawingml/2006/compatibility" xmlns:pvml="urn:schemas-microsoft-com:office:powerpoint" xmlns:v="urn:schemas-microsoft-com:vml" xmlns:o="urn:schemas-microsoft-com:office:office" xmlns:dgm="http://schemas.openxmlformats.org/drawingml/2006/diagram" xmlns:c="http://schemas.openxmlformats.org/drawingml/2006/chart" xmlns:mv="urn:schemas-microsoft-com:mac:vml" xmlns="">
       <p:transition>
         <p:fade/>
       </p:transition>
@@ -10529,7 +10542,7 @@
         <p:fade/>
       </p:transition>
     </mc:Choice>
-    <mc:Fallback xmlns:ahyp="http://schemas.microsoft.com/office/drawing/2018/hyperlinkcolor" xmlns:p15="http://schemas.microsoft.com/office/powerpoint/2012/main" xmlns:com="http://schemas.openxmlformats.org/drawingml/2006/compatibility" xmlns:pvml="urn:schemas-microsoft-com:office:powerpoint" xmlns:v="urn:schemas-microsoft-com:vml" xmlns:o="urn:schemas-microsoft-com:office:office" xmlns:dgm="http://schemas.openxmlformats.org/drawingml/2006/diagram" xmlns:c="http://schemas.openxmlformats.org/drawingml/2006/chart" xmlns:mv="urn:schemas-microsoft-com:mac:vml" xmlns="">
+    <mc:Fallback xmlns="" xmlns:mv="urn:schemas-microsoft-com:mac:vml" xmlns:c="http://schemas.openxmlformats.org/drawingml/2006/chart" xmlns:dgm="http://schemas.openxmlformats.org/drawingml/2006/diagram" xmlns:o="urn:schemas-microsoft-com:office:office" xmlns:v="urn:schemas-microsoft-com:vml" xmlns:pvml="urn:schemas-microsoft-com:office:powerpoint" xmlns:com="http://schemas.openxmlformats.org/drawingml/2006/compatibility" xmlns:p15="http://schemas.microsoft.com/office/powerpoint/2012/main" xmlns:ahyp="http://schemas.microsoft.com/office/drawing/2018/hyperlinkcolor">
       <p:transition>
         <p:fade/>
       </p:transition>
@@ -10637,8 +10650,113 @@
               <a:buNone/>
             </a:pPr>
             <a:r>
-              <a:rPr lang="en-US" sz="2000" dirty="0"/>
-              <a:t>In this activity, the camera feed is loaded using Open-CV Python [1]. The main principle of video processing is that videos are a collection of sequential images, hence, the image processing techniques can still be applied frame by frame. Shown below is a snapshot from the webcam and the corresponding histogram of the image and a region of interest (ROI). The entire image has a continuous distribution across all channels while the ROI is distinguishable by its narrow distribution.</a:t>
+              <a:rPr lang="en-US" sz="1800" dirty="0"/>
+              <a:t>In this activity, the camera feed is loaded using Open-CV Python [1]. The main principle of video processing is that </a:t>
+            </a:r>
+            <a:r>
+              <a:rPr lang="en-US" sz="1800" dirty="0">
+                <a:latin typeface="Bahnschrift SemiBold" panose="020B0502040204020203" pitchFamily="34" charset="0"/>
+              </a:rPr>
+              <a:t>videos are a collection of sequential images</a:t>
+            </a:r>
+            <a:r>
+              <a:rPr lang="en-US" sz="1800" dirty="0"/>
+              <a:t>, hence, the </a:t>
+            </a:r>
+            <a:r>
+              <a:rPr lang="en-US" sz="1800" dirty="0">
+                <a:latin typeface="Bahnschrift SemiBold" panose="020B0502040204020203" pitchFamily="34" charset="0"/>
+              </a:rPr>
+              <a:t>image processing</a:t>
+            </a:r>
+            <a:r>
+              <a:rPr lang="en-US" sz="1800" dirty="0"/>
+              <a:t> techniques can still be </a:t>
+            </a:r>
+            <a:r>
+              <a:rPr lang="en-US" sz="1800" dirty="0">
+                <a:latin typeface="Bahnschrift SemiBold" panose="020B0502040204020203" pitchFamily="34" charset="0"/>
+              </a:rPr>
+              <a:t>applied frame by frame</a:t>
+            </a:r>
+            <a:r>
+              <a:rPr lang="en-US" sz="1800" dirty="0"/>
+              <a:t>. Shown below is a snapshot from the webcam and the corresponding histograms of the image and the cyan region of interest (ROI). The entire image has a continuous distribution across all channels while the ROI have a distinct and narrow distributions. The </a:t>
+            </a:r>
+            <a:r>
+              <a:rPr lang="en-US" sz="1800" dirty="0">
+                <a:solidFill>
+                  <a:srgbClr val="00B0F0"/>
+                </a:solidFill>
+                <a:latin typeface="Bahnschrift SemiBold" panose="020B0502040204020203" pitchFamily="34" charset="0"/>
+              </a:rPr>
+              <a:t>ROI</a:t>
+            </a:r>
+            <a:r>
+              <a:rPr lang="en-US" sz="1800" dirty="0"/>
+              <a:t> shows high pixel intensities in its </a:t>
+            </a:r>
+            <a:r>
+              <a:rPr lang="en-US" sz="1800" dirty="0">
+                <a:solidFill>
+                  <a:srgbClr val="00B050"/>
+                </a:solidFill>
+                <a:latin typeface="Bahnschrift SemiBold" panose="020B0502040204020203" pitchFamily="34" charset="0"/>
+              </a:rPr>
+              <a:t>green</a:t>
+            </a:r>
+            <a:r>
+              <a:rPr lang="en-US" sz="1800" dirty="0"/>
+              <a:t> and </a:t>
+            </a:r>
+            <a:r>
+              <a:rPr lang="en-US" sz="1800" dirty="0">
+                <a:solidFill>
+                  <a:srgbClr val="0070C0"/>
+                </a:solidFill>
+                <a:latin typeface="Bahnschrift SemiBold" panose="020B0502040204020203" pitchFamily="34" charset="0"/>
+              </a:rPr>
+              <a:t>blue</a:t>
+            </a:r>
+            <a:r>
+              <a:rPr lang="en-US" sz="1800" dirty="0"/>
+              <a:t> </a:t>
+            </a:r>
+            <a:r>
+              <a:rPr lang="en-US" sz="1800" dirty="0">
+                <a:latin typeface="Bahnschrift SemiBold" panose="020B0502040204020203" pitchFamily="34" charset="0"/>
+              </a:rPr>
+              <a:t>histograms</a:t>
+            </a:r>
+            <a:r>
+              <a:rPr lang="en-US" sz="1800" dirty="0"/>
+              <a:t>; the two primary color channels constituting the </a:t>
+            </a:r>
+            <a:r>
+              <a:rPr lang="en-US" sz="1800" dirty="0">
+                <a:solidFill>
+                  <a:srgbClr val="00B0F0"/>
+                </a:solidFill>
+                <a:latin typeface="Bahnschrift SemiBold" panose="020B0502040204020203" pitchFamily="34" charset="0"/>
+              </a:rPr>
+              <a:t>cyan</a:t>
+            </a:r>
+            <a:r>
+              <a:rPr lang="en-US" sz="1800" dirty="0"/>
+              <a:t> </a:t>
+            </a:r>
+            <a:r>
+              <a:rPr lang="en-US" sz="1800" dirty="0">
+                <a:solidFill>
+                  <a:srgbClr val="00B0F0"/>
+                </a:solidFill>
+                <a:latin typeface="Bahnschrift SemiBold" panose="020B0502040204020203" pitchFamily="34" charset="0"/>
+              </a:rPr>
+              <a:t>color</a:t>
+            </a:r>
+            <a:r>
+              <a:rPr lang="en-US" sz="1800" dirty="0"/>
+              <a:t>.</a:t>
             </a:r>
           </a:p>
         </p:txBody>
@@ -10701,7 +10819,7 @@
         </p:blipFill>
         <p:spPr bwMode="auto">
           <a:xfrm>
-            <a:off x="914400" y="3654089"/>
+            <a:off x="914400" y="3543301"/>
             <a:ext cx="7315200" cy="2813050"/>
           </a:xfrm>
           <a:prstGeom prst="rect">
@@ -10838,16 +10956,7 @@
               <a:buNone/>
             </a:pPr>
             <a:r>
-              <a:rPr lang="en-US" sz="2000" dirty="0">
-                <a:solidFill>
-                  <a:srgbClr val="000000"/>
-                </a:solidFill>
-                <a:latin typeface="Bahnschrift SemiLight" panose="020B0502040204020203" pitchFamily="34" charset="0"/>
-              </a:rPr>
-              <a:t>Non-parametric segmentation uses the </a:t>
-            </a:r>
-            <a:r>
-              <a:rPr lang="en-US" sz="2000" dirty="0">
+              <a:rPr lang="en-US" sz="1800" dirty="0">
                 <a:solidFill>
                   <a:srgbClr val="000000"/>
                 </a:solidFill>
@@ -10856,10 +10965,28 @@
                 </a:highlight>
                 <a:latin typeface="Bahnschrift SemiBold" panose="020B0502040204020203" pitchFamily="34" charset="0"/>
               </a:rPr>
+              <a:t>Non-parametric segmentation</a:t>
+            </a:r>
+            <a:r>
+              <a:rPr lang="en-US" sz="1800" dirty="0">
+                <a:solidFill>
+                  <a:srgbClr val="000000"/>
+                </a:solidFill>
+                <a:latin typeface="Bahnschrift SemiLight" panose="020B0502040204020203" pitchFamily="34" charset="0"/>
+              </a:rPr>
+              <a:t> uses the </a:t>
+            </a:r>
+            <a:r>
+              <a:rPr lang="en-US" sz="1800" dirty="0">
+                <a:solidFill>
+                  <a:srgbClr val="000000"/>
+                </a:solidFill>
+                <a:latin typeface="Bahnschrift SemiBold" panose="020B0502040204020203" pitchFamily="34" charset="0"/>
+              </a:rPr>
               <a:t>histogram back-projection</a:t>
             </a:r>
             <a:r>
-              <a:rPr lang="en-US" sz="2000" dirty="0">
+              <a:rPr lang="en-US" sz="1800" dirty="0">
                 <a:solidFill>
                   <a:srgbClr val="000000"/>
                 </a:solidFill>
@@ -10868,7 +10995,72 @@
               <a:t>, a </a:t>
             </a:r>
             <a:r>
-              <a:rPr lang="en-US" sz="2000" b="1" dirty="0">
+              <a:rPr lang="en-US" sz="1800" b="1" dirty="0">
+                <a:solidFill>
+                  <a:srgbClr val="000000"/>
+                </a:solidFill>
+                <a:latin typeface="Bahnschrift SemiBold" panose="020B0502040204020203" pitchFamily="34" charset="0"/>
+              </a:rPr>
+              <a:t>non-computational</a:t>
+            </a:r>
+            <a:r>
+              <a:rPr lang="en-US" sz="1800" dirty="0">
+                <a:solidFill>
+                  <a:srgbClr val="000000"/>
+                </a:solidFill>
+                <a:latin typeface="Bahnschrift SemiLight" panose="020B0502040204020203" pitchFamily="34" charset="0"/>
+              </a:rPr>
+              <a:t> technique </a:t>
+            </a:r>
+            <a:r>
+              <a:rPr lang="en-US" sz="1800" dirty="0">
+                <a:solidFill>
+                  <a:srgbClr val="000000"/>
+                </a:solidFill>
+              </a:rPr>
+              <a:t>which </a:t>
+            </a:r>
+            <a:r>
+              <a:rPr lang="en-US" sz="1800" dirty="0">
+                <a:solidFill>
+                  <a:srgbClr val="000000"/>
+                </a:solidFill>
+                <a:latin typeface="Bahnschrift SemiLight" panose="020B0502040204020203" pitchFamily="34" charset="0"/>
+              </a:rPr>
+              <a:t>treats histograms as look-up tables </a:t>
+            </a:r>
+            <a:r>
+              <a:rPr lang="en-US" sz="1800" dirty="0"/>
+              <a:t>[2][3]</a:t>
+            </a:r>
+            <a:r>
+              <a:rPr lang="en-US" sz="1800" dirty="0">
+                <a:solidFill>
+                  <a:srgbClr val="000000"/>
+                </a:solidFill>
+                <a:latin typeface="Bahnschrift SemiLight" panose="020B0502040204020203" pitchFamily="34" charset="0"/>
+              </a:rPr>
+              <a:t>. </a:t>
+            </a:r>
+            <a:r>
+              <a:rPr lang="en-US" sz="1800" dirty="0">
+                <a:solidFill>
+                  <a:srgbClr val="000000"/>
+                </a:solidFill>
+              </a:rPr>
+              <a:t>Recall that in Activity 1, the non-parametric method </a:t>
+            </a:r>
+            <a:r>
+              <a:rPr lang="en-US" sz="1800" dirty="0">
+                <a:solidFill>
+                  <a:srgbClr val="000000"/>
+                </a:solidFill>
+                <a:latin typeface="Bahnschrift SemiLight" panose="020B0502040204020203" pitchFamily="34" charset="0"/>
+              </a:rPr>
+              <a:t>was generalized to be </a:t>
+            </a:r>
+            <a:r>
+              <a:rPr lang="en-US" sz="1800" dirty="0">
                 <a:solidFill>
                   <a:srgbClr val="000000"/>
                 </a:solidFill>
@@ -10877,64 +11069,87 @@
                 </a:highlight>
                 <a:latin typeface="Bahnschrift SemiBold" panose="020B0502040204020203" pitchFamily="34" charset="0"/>
               </a:rPr>
-              <a:t>non-computational</a:t>
-            </a:r>
-            <a:r>
-              <a:rPr lang="en-US" sz="2000" dirty="0">
+              <a:t>robust to intensity variation and can sometimes reveal extra details</a:t>
+            </a:r>
+            <a:r>
+              <a:rPr lang="en-US" sz="1800" dirty="0">
                 <a:solidFill>
                   <a:srgbClr val="000000"/>
                 </a:solidFill>
                 <a:latin typeface="Bahnschrift SemiLight" panose="020B0502040204020203" pitchFamily="34" charset="0"/>
               </a:rPr>
-              <a:t> technique since it treats histograms as just look-up tables </a:t>
-            </a:r>
-            <a:r>
-              <a:rPr lang="en-US" sz="2000" dirty="0"/>
-              <a:t>[2][3]</a:t>
-            </a:r>
-            <a:r>
-              <a:rPr lang="en-US" sz="2000" dirty="0">
+              <a:t>. We exploit this method’s advantage because in this activity, we’re dealing with scenes in very non-ideal conditions. Shown below is sample image segmentation of the </a:t>
+            </a:r>
+            <a:r>
+              <a:rPr lang="en-US" sz="1800" dirty="0">
+                <a:solidFill>
+                  <a:srgbClr val="00B0F0"/>
+                </a:solidFill>
+                <a:latin typeface="Bahnschrift SemiBold" panose="020B0502040204020203" pitchFamily="34" charset="0"/>
+              </a:rPr>
+              <a:t>cyan aquaflask</a:t>
+            </a:r>
+            <a:r>
+              <a:rPr lang="en-US" sz="1800" dirty="0">
                 <a:solidFill>
                   <a:srgbClr val="000000"/>
                 </a:solidFill>
                 <a:latin typeface="Bahnschrift SemiLight" panose="020B0502040204020203" pitchFamily="34" charset="0"/>
               </a:rPr>
-              <a:t>. </a:t>
-            </a:r>
-            <a:r>
-              <a:rPr lang="en-US" sz="2000" dirty="0">
+              <a:t> </a:t>
+            </a:r>
+            <a:r>
+              <a:rPr lang="en-US" sz="1800" dirty="0">
                 <a:solidFill>
                   <a:srgbClr val="000000"/>
                 </a:solidFill>
               </a:rPr>
-              <a:t>Recall that in Activity 1, the non-parametric method </a:t>
-            </a:r>
-            <a:r>
-              <a:rPr lang="en-US" sz="2000" dirty="0">
+              <a:t>a</a:t>
+            </a:r>
+            <a:r>
+              <a:rPr lang="en-US" sz="1800" dirty="0">
                 <a:solidFill>
                   <a:srgbClr val="000000"/>
                 </a:solidFill>
                 <a:latin typeface="Bahnschrift SemiLight" panose="020B0502040204020203" pitchFamily="34" charset="0"/>
               </a:rPr>
-              <a:t>was generalized to be robust to intensity variation and can sometimes reveal extra details. This may be beneficial in this activity especially that we’re dealing with scenes in very non-ideal conditions. Shown below is the sample segmentation of the blue </a:t>
-            </a:r>
-            <a:r>
-              <a:rPr lang="en-US" sz="2000" dirty="0" err="1">
+              <a:t>s the object of interest. To track the object’s movement, we employed </a:t>
+            </a:r>
+            <a:r>
+              <a:rPr lang="en-US" sz="1800" dirty="0">
+                <a:solidFill>
+                  <a:srgbClr val="000000"/>
+                </a:solidFill>
+                <a:latin typeface="Bahnschrift SemiBold" panose="020B0502040204020203" pitchFamily="34" charset="0"/>
+              </a:rPr>
+              <a:t>blob detection </a:t>
+            </a:r>
+            <a:r>
+              <a:rPr lang="en-US" sz="1800" dirty="0">
                 <a:solidFill>
                   <a:srgbClr val="000000"/>
                 </a:solidFill>
                 <a:latin typeface="Bahnschrift SemiLight" panose="020B0502040204020203" pitchFamily="34" charset="0"/>
               </a:rPr>
-              <a:t>aquaflask</a:t>
-            </a:r>
-            <a:r>
-              <a:rPr lang="en-US" sz="2000" dirty="0">
+              <a:t>using the image moments to </a:t>
+            </a:r>
+            <a:r>
+              <a:rPr lang="en-US" sz="1800" dirty="0">
+                <a:solidFill>
+                  <a:srgbClr val="000000"/>
+                </a:solidFill>
+                <a:latin typeface="Bahnschrift SemiBold" panose="020B0502040204020203" pitchFamily="34" charset="0"/>
+              </a:rPr>
+              <a:t>get the centroid coordinates</a:t>
+            </a:r>
+            <a:r>
+              <a:rPr lang="en-US" sz="1800" dirty="0">
                 <a:solidFill>
                   <a:srgbClr val="000000"/>
                 </a:solidFill>
                 <a:latin typeface="Bahnschrift SemiLight" panose="020B0502040204020203" pitchFamily="34" charset="0"/>
               </a:rPr>
-              <a:t>. Since we aim to track the ROI’s movement, we employed blob detection using the image moments to get the centroid coordinates and bound the region in a circle [4].</a:t>
+              <a:t> [4]. </a:t>
             </a:r>
           </a:p>
         </p:txBody>
@@ -10997,8 +11212,8 @@
         </p:blipFill>
         <p:spPr bwMode="auto">
           <a:xfrm>
-            <a:off x="1871661" y="4257834"/>
-            <a:ext cx="5486400" cy="2008823"/>
+            <a:off x="1371600" y="3833336"/>
+            <a:ext cx="6400800" cy="2343627"/>
           </a:xfrm>
           <a:prstGeom prst="rect">
             <a:avLst/>
@@ -11128,7 +11343,7 @@
             </a:pPr>
             <a:r>
               <a:rPr lang="en-US" sz="1800" dirty="0"/>
-              <a:t>From the webcam live feed, we process 100 frames. For reference, I moved the aqua flask in a sinusoidal manner. Shown below are some snapshots at different times:</a:t>
+              <a:t>From the webcam live feed, we first took 100 frames, segmented each image, and then stored the centroid coordinates. Shown below are some snapshots at different time frames while I move the object sinusoidally.</a:t>
             </a:r>
           </a:p>
           <a:p>
@@ -11591,7 +11806,37 @@
             </a:pPr>
             <a:r>
               <a:rPr lang="en-US" sz="1800" dirty="0"/>
-              <a:t>We were able to acquire live images from webcam and applied color segmentation. Fundamental problems include the (1) built-in white balancing in the webcam used which drastically changes the colors in the scene and (2) poor resolution and low-frame rate of webcams. The effects are evident on the later half of the tracking where the color segmentation struggles, consequently affecting the centroid detection. Overall, the tracking algorithm worked, and objectives were met.</a:t>
+              <a:t>In summary, we were able to acquire live images from webcam and applied color segmentation to track objects. </a:t>
+            </a:r>
+            <a:r>
+              <a:rPr lang="en-US" sz="1800" dirty="0">
+                <a:latin typeface="Bahnschrift SemiBold" panose="020B0502040204020203" pitchFamily="34" charset="0"/>
+              </a:rPr>
+              <a:t>Fundamental problems</a:t>
+            </a:r>
+            <a:r>
+              <a:rPr lang="en-US" sz="1800" dirty="0"/>
+              <a:t> include (1) built-in </a:t>
+            </a:r>
+            <a:r>
+              <a:rPr lang="en-US" sz="1800" dirty="0">
+                <a:latin typeface="Bahnschrift SemiBold" panose="020B0502040204020203" pitchFamily="34" charset="0"/>
+              </a:rPr>
+              <a:t>auto white-balancing</a:t>
+            </a:r>
+            <a:r>
+              <a:rPr lang="en-US" sz="1800" dirty="0"/>
+              <a:t> in the webcam used which continuously change the colors in the scene and (2) </a:t>
+            </a:r>
+            <a:r>
+              <a:rPr lang="en-US" sz="1800" dirty="0">
+                <a:latin typeface="Bahnschrift SemiBold" panose="020B0502040204020203" pitchFamily="34" charset="0"/>
+              </a:rPr>
+              <a:t>low resolution/frame rate</a:t>
+            </a:r>
+            <a:r>
+              <a:rPr lang="en-US" sz="1800" dirty="0"/>
+              <a:t> which results to poor capture of the motion. The effects are evident on the latter half of the tracking where the segmentation evidently struggles, consequently affecting the centroid detection and thus, the tracking.</a:t>
             </a:r>
           </a:p>
         </p:txBody>
@@ -11654,8 +11899,8 @@
         </p:blipFill>
         <p:spPr bwMode="auto">
           <a:xfrm>
-            <a:off x="457200" y="3142889"/>
-            <a:ext cx="8229600" cy="3213462"/>
+            <a:off x="914400" y="3320552"/>
+            <a:ext cx="7315200" cy="2856411"/>
           </a:xfrm>
           <a:prstGeom prst="rect">
             <a:avLst/>
@@ -11672,6 +11917,82 @@
           </a:extLst>
         </p:spPr>
       </p:pic>
+      <p:sp>
+        <p:nvSpPr>
+          <p:cNvPr id="10" name="TextBox 9">
+            <a:extLst>
+              <a:ext uri="{FF2B5EF4-FFF2-40B4-BE49-F238E27FC236}">
+                <a16:creationId xmlns:a16="http://schemas.microsoft.com/office/drawing/2014/main" id="{06B1A6AD-FF7C-CFE7-A327-F8F1FBEEA145}"/>
+              </a:ext>
+            </a:extLst>
+          </p:cNvPr>
+          <p:cNvSpPr txBox="1"/>
+          <p:nvPr/>
+        </p:nvSpPr>
+        <p:spPr>
+          <a:xfrm>
+            <a:off x="628648" y="6068246"/>
+            <a:ext cx="7781927" cy="288105"/>
+          </a:xfrm>
+          <a:prstGeom prst="rect">
+            <a:avLst/>
+          </a:prstGeom>
+          <a:noFill/>
+        </p:spPr>
+        <p:txBody>
+          <a:bodyPr wrap="square">
+            <a:noAutofit/>
+          </a:bodyPr>
+          <a:lstStyle/>
+          <a:p>
+            <a:r>
+              <a:rPr lang="en-US" sz="1200" dirty="0">
+                <a:highlight>
+                  <a:srgbClr val="FFEE9E"/>
+                </a:highlight>
+                <a:latin typeface="Bahnschrift SemiBold" panose="020B0502040204020203" pitchFamily="34" charset="0"/>
+              </a:rPr>
+              <a:t>View GIF here:</a:t>
+            </a:r>
+            <a:r>
+              <a:rPr lang="en-US" sz="1200" dirty="0">
+                <a:latin typeface="Bahnschrift SemiLight" panose="020B0502040204020203" pitchFamily="34" charset="0"/>
+              </a:rPr>
+              <a:t> </a:t>
+            </a:r>
+            <a:r>
+              <a:rPr lang="en-US" sz="1200" dirty="0">
+                <a:solidFill>
+                  <a:srgbClr val="D64045"/>
+                </a:solidFill>
+                <a:latin typeface="Bahnschrift SemiLight" panose="020B0502040204020203" pitchFamily="34" charset="0"/>
+                <a:hlinkClick r:id="rId3">
+                  <a:extLst>
+                    <a:ext uri="{A12FA001-AC4F-418D-AE19-62706E023703}">
+                      <ahyp:hlinkClr xmlns:ahyp="http://schemas.microsoft.com/office/drawing/2018/hyperlinkcolor" val="tx"/>
+                    </a:ext>
+                  </a:extLst>
+                </a:hlinkClick>
+              </a:rPr>
+              <a:t>https://giphy.com/gifs/python-tracking-video-processing-hJO3Sw9Hq0HOsO60TX/fullscreen</a:t>
+            </a:r>
+            <a:r>
+              <a:rPr lang="en-US" sz="1200" dirty="0">
+                <a:latin typeface="Bahnschrift SemiLight" panose="020B0502040204020203" pitchFamily="34" charset="0"/>
+              </a:rPr>
+              <a:t> </a:t>
+            </a:r>
+          </a:p>
+          <a:p>
+            <a:r>
+              <a:rPr lang="en-US" sz="1200" dirty="0">
+                <a:latin typeface="Bahnschrift SemiLight" panose="020B0502040204020203" pitchFamily="34" charset="0"/>
+              </a:rPr>
+              <a:t> </a:t>
+            </a:r>
+          </a:p>
+        </p:txBody>
+      </p:sp>
     </p:spTree>
     <p:extLst>
       <p:ext uri="{BB962C8B-B14F-4D97-AF65-F5344CB8AC3E}">
@@ -11789,8 +12110,31 @@
               <a:buNone/>
             </a:pPr>
             <a:r>
-              <a:rPr lang="en-US"/>
-              <a:t>For</a:t>
+              <a:rPr lang="en-US" sz="1800" dirty="0"/>
+              <a:t>Since we’ve been limited by the resolution, framerate, and auto white-balancing of a webcam, here we try to </a:t>
+            </a:r>
+            <a:r>
+              <a:rPr lang="en-US" sz="1800" dirty="0">
+                <a:latin typeface="Bahnschrift SemiBold" panose="020B0502040204020203" pitchFamily="34" charset="0"/>
+              </a:rPr>
+              <a:t>apply tracking on a video recorded using a digital camera</a:t>
+            </a:r>
+            <a:r>
+              <a:rPr lang="en-US" sz="1800" dirty="0"/>
+              <a:t>. To demonstrate a sample practical application, which I also did in my App Physics 186 class, we attempt to </a:t>
+            </a:r>
+            <a:r>
+              <a:rPr lang="en-US" sz="1800" dirty="0">
+                <a:highlight>
+                  <a:srgbClr val="FFEE9E"/>
+                </a:highlight>
+                <a:latin typeface="Bahnschrift SemiBold" panose="020B0502040204020203" pitchFamily="34" charset="0"/>
+              </a:rPr>
+              <a:t>track free fall motion and experimentally determine the acceleration due to gravity</a:t>
+            </a:r>
+            <a:r>
+              <a:rPr lang="en-US" sz="1800" dirty="0"/>
+              <a:t> [5]. The video used is at 60 frames-per-second, color-consistent, and has a high resolution. Shown below is a snapshot of the first image frame and the comparison of its histogram vs the ROI’s (pink rubber ball). </a:t>
             </a:r>
           </a:p>
         </p:txBody>
@@ -11853,8 +12197,8 @@
         </p:blipFill>
         <p:spPr bwMode="auto">
           <a:xfrm>
-            <a:off x="457200" y="2542223"/>
-            <a:ext cx="8229600" cy="3634740"/>
+            <a:off x="1371600" y="3529331"/>
+            <a:ext cx="6400800" cy="2827020"/>
           </a:xfrm>
           <a:prstGeom prst="rect">
             <a:avLst/>
@@ -11978,7 +12322,126 @@
           <a:bodyPr/>
           <a:lstStyle/>
           <a:p>
-            <a:endParaRPr lang="en-US"/>
+            <a:pPr marL="0" indent="0">
+              <a:buNone/>
+            </a:pPr>
+            <a:r>
+              <a:rPr lang="en-US" sz="1800" dirty="0"/>
+              <a:t>Overall, the segmentation and centroid detection went smooth, not to mention that there were no artifacts since we have a uniform background.</a:t>
+            </a:r>
+          </a:p>
+          <a:p>
+            <a:pPr marL="0" indent="0">
+              <a:buNone/>
+            </a:pPr>
+            <a:endParaRPr lang="en-US" sz="1800" dirty="0"/>
+          </a:p>
+          <a:p>
+            <a:pPr marL="0" indent="0">
+              <a:buNone/>
+            </a:pPr>
+            <a:br>
+              <a:rPr lang="en-US" sz="1800" dirty="0"/>
+            </a:br>
+            <a:br>
+              <a:rPr lang="en-US" sz="1800" dirty="0"/>
+            </a:br>
+            <a:br>
+              <a:rPr lang="en-US" sz="1800" dirty="0"/>
+            </a:br>
+            <a:br>
+              <a:rPr lang="en-US" sz="1800" dirty="0"/>
+            </a:br>
+            <a:endParaRPr lang="en-US" sz="1800" dirty="0"/>
+          </a:p>
+          <a:p>
+            <a:pPr marL="0" indent="457200">
+              <a:buNone/>
+            </a:pPr>
+            <a:r>
+              <a:rPr lang="en-US" sz="1800" dirty="0"/>
+              <a:t>Using the </a:t>
+            </a:r>
+            <a:r>
+              <a:rPr lang="en-US" sz="1800" dirty="0">
+                <a:latin typeface="Bahnschrift SemiBold" panose="020B0502040204020203" pitchFamily="34" charset="0"/>
+              </a:rPr>
+              <a:t>pixel-to-meter ratio</a:t>
+            </a:r>
+            <a:r>
+              <a:rPr lang="en-US" sz="1800" dirty="0"/>
+              <a:t> obtained by relating the balls diameter in pixels and in meters, we were able to </a:t>
+            </a:r>
+            <a:r>
+              <a:rPr lang="en-US" sz="1800" dirty="0">
+                <a:latin typeface="Bahnschrift SemiBold" panose="020B0502040204020203" pitchFamily="34" charset="0"/>
+              </a:rPr>
+              <a:t>convert pixel trajectory into actual height values</a:t>
+            </a:r>
+            <a:r>
+              <a:rPr lang="en-US" sz="1800" dirty="0"/>
+              <a:t>. To extract g</a:t>
+            </a:r>
+            <a:r>
+              <a:rPr lang="en-US" sz="1800" baseline="-25000" dirty="0"/>
+              <a:t>exp</a:t>
+            </a:r>
+            <a:r>
+              <a:rPr lang="en-US" sz="1800" dirty="0"/>
+              <a:t>, we take the first and second derivative of the trajectory which represents the velocity and acceleration functions of the free-falling body, respectively. As shown in the plots (next page), we got </a:t>
+            </a:r>
+            <a:r>
+              <a:rPr lang="en-US" sz="1800" dirty="0">
+                <a:latin typeface="Bahnschrift SemiBold" panose="020B0502040204020203" pitchFamily="34" charset="0"/>
+              </a:rPr>
+              <a:t>g</a:t>
+            </a:r>
+            <a:r>
+              <a:rPr lang="en-US" sz="1800" baseline="-25000" dirty="0">
+                <a:latin typeface="Bahnschrift SemiBold" panose="020B0502040204020203" pitchFamily="34" charset="0"/>
+              </a:rPr>
+              <a:t>exp </a:t>
+            </a:r>
+            <a:r>
+              <a:rPr lang="en-US" sz="1800" dirty="0">
+                <a:latin typeface="Bahnschrift SemiBold" panose="020B0502040204020203" pitchFamily="34" charset="0"/>
+              </a:rPr>
+              <a:t>= -9.79 m/s</a:t>
+            </a:r>
+            <a:r>
+              <a:rPr lang="en-US" sz="1800" baseline="30000" dirty="0">
+                <a:latin typeface="Bahnschrift SemiBold" panose="020B0502040204020203" pitchFamily="34" charset="0"/>
+              </a:rPr>
+              <a:t>2</a:t>
+            </a:r>
+            <a:r>
+              <a:rPr lang="en-US" sz="1800" dirty="0"/>
+              <a:t>, which deviates by </a:t>
+            </a:r>
+            <a:r>
+              <a:rPr lang="en-US" sz="1800" dirty="0">
+                <a:latin typeface="Bahnschrift SemiBold" panose="020B0502040204020203" pitchFamily="34" charset="0"/>
+              </a:rPr>
+              <a:t>0.2% from the theoretical value</a:t>
+            </a:r>
+            <a:r>
+              <a:rPr lang="en-US" sz="1800" dirty="0"/>
+              <a:t>. </a:t>
+            </a:r>
+          </a:p>
+          <a:p>
+            <a:pPr marL="0" indent="457200">
+              <a:buNone/>
+            </a:pPr>
+            <a:r>
+              <a:rPr lang="en-US" sz="1800" dirty="0">
+                <a:highlight>
+                  <a:srgbClr val="FFEE9E"/>
+                </a:highlight>
+                <a:latin typeface="Bahnschrift SemiBold" panose="020B0502040204020203" pitchFamily="34" charset="0"/>
+              </a:rPr>
+              <a:t>In conclusion, we were able to successfully perform a kinematics experiment through video processing.</a:t>
+            </a:r>
           </a:p>
         </p:txBody>
       </p:sp>
@@ -12020,13 +12483,15 @@
               </a:ext>
             </a:extLst>
           </p:cNvPr>
-          <p:cNvGrpSpPr/>
+          <p:cNvGrpSpPr>
+            <a:grpSpLocks noChangeAspect="1"/>
+          </p:cNvGrpSpPr>
           <p:nvPr/>
         </p:nvGrpSpPr>
         <p:grpSpPr>
           <a:xfrm>
-            <a:off x="470517" y="1719932"/>
-            <a:ext cx="8044832" cy="1709068"/>
+            <a:off x="228600" y="1722662"/>
+            <a:ext cx="8686800" cy="1845450"/>
             <a:chOff x="485275" y="1827462"/>
             <a:chExt cx="8044832" cy="1709068"/>
           </a:xfrm>
@@ -12220,53 +12685,82 @@
           </p:spPr>
         </p:pic>
       </p:grpSp>
-      <p:pic>
-        <p:nvPicPr>
-          <p:cNvPr id="6160" name="Picture 16">
+      <p:sp>
+        <p:nvSpPr>
+          <p:cNvPr id="12" name="TextBox 11">
             <a:extLst>
               <a:ext uri="{FF2B5EF4-FFF2-40B4-BE49-F238E27FC236}">
-                <a16:creationId xmlns:a16="http://schemas.microsoft.com/office/drawing/2014/main" id="{E182BDDC-1666-E47B-80D7-CA4576C537E4}"/>
+                <a16:creationId xmlns:a16="http://schemas.microsoft.com/office/drawing/2014/main" id="{FAFA4DAF-BEB4-0DDA-71E6-5164BBFC07DD}"/>
               </a:ext>
             </a:extLst>
           </p:cNvPr>
-          <p:cNvPicPr>
-            <a:picLocks noChangeAspect="1" noChangeArrowheads="1"/>
-          </p:cNvPicPr>
+          <p:cNvSpPr txBox="1"/>
           <p:nvPr/>
-        </p:nvPicPr>
-        <p:blipFill>
-          <a:blip r:embed="rId6">
-            <a:extLst>
-              <a:ext uri="{28A0092B-C50C-407E-A947-70E740481C1C}">
-                <a14:useLocalDpi xmlns:a14="http://schemas.microsoft.com/office/drawing/2010/main" val="0"/>
-              </a:ext>
-            </a:extLst>
-          </a:blip>
-          <a:srcRect/>
-          <a:stretch>
-            <a:fillRect/>
-          </a:stretch>
-        </p:blipFill>
-        <p:spPr bwMode="auto">
+        </p:nvSpPr>
+        <p:spPr>
           <a:xfrm>
-            <a:off x="378133" y="3954874"/>
-            <a:ext cx="8229600" cy="2396014"/>
+            <a:off x="628648" y="3525071"/>
+            <a:ext cx="7781927" cy="288105"/>
           </a:xfrm>
           <a:prstGeom prst="rect">
             <a:avLst/>
           </a:prstGeom>
           <a:noFill/>
-          <a:extLst>
-            <a:ext uri="{909E8E84-426E-40DD-AFC4-6F175D3DCCD1}">
-              <a14:hiddenFill xmlns:a14="http://schemas.microsoft.com/office/drawing/2010/main">
+        </p:spPr>
+        <p:txBody>
+          <a:bodyPr wrap="square">
+            <a:noAutofit/>
+          </a:bodyPr>
+          <a:lstStyle/>
+          <a:p>
+            <a:r>
+              <a:rPr lang="en-US" sz="1200" dirty="0">
+                <a:highlight>
+                  <a:srgbClr val="FFEE9E"/>
+                </a:highlight>
+                <a:latin typeface="Bahnschrift SemiBold" panose="020B0502040204020203" pitchFamily="34" charset="0"/>
+              </a:rPr>
+              <a:t>View GIF here:</a:t>
+            </a:r>
+            <a:r>
+              <a:rPr lang="en-US" sz="1200" dirty="0">
+                <a:latin typeface="Bahnschrift SemiLight" panose="020B0502040204020203" pitchFamily="34" charset="0"/>
+              </a:rPr>
+              <a:t> </a:t>
+            </a:r>
+            <a:r>
+              <a:rPr lang="en-US" sz="1200" dirty="0">
                 <a:solidFill>
-                  <a:srgbClr val="FFFFFF"/>
+                  <a:srgbClr val="D64045"/>
                 </a:solidFill>
-              </a14:hiddenFill>
-            </a:ext>
-          </a:extLst>
-        </p:spPr>
-      </p:pic>
+                <a:latin typeface="Bahnschrift SemiLight" panose="020B0502040204020203" pitchFamily="34" charset="0"/>
+                <a:hlinkClick r:id="rId6">
+                  <a:extLst>
+                    <a:ext uri="{A12FA001-AC4F-418D-AE19-62706E023703}">
+                      <ahyp:hlinkClr xmlns:ahyp="http://schemas.microsoft.com/office/drawing/2018/hyperlinkcolor" val="tx"/>
+                    </a:ext>
+                  </a:extLst>
+                </a:hlinkClick>
+              </a:rPr>
+              <a:t>https://giphy.com/gifs/python-tracking-opencv-D4xFw0VusmBMC0UlKf/fullscreen</a:t>
+            </a:r>
+            <a:r>
+              <a:rPr lang="en-US" sz="1200" dirty="0">
+                <a:latin typeface="Bahnschrift SemiLight" panose="020B0502040204020203" pitchFamily="34" charset="0"/>
+              </a:rPr>
+              <a:t>  </a:t>
+            </a:r>
+          </a:p>
+          <a:p>
+            <a:r>
+              <a:rPr lang="en-US" sz="1200" dirty="0">
+                <a:latin typeface="Bahnschrift SemiLight" panose="020B0502040204020203" pitchFamily="34" charset="0"/>
+              </a:rPr>
+              <a:t> </a:t>
+            </a:r>
+          </a:p>
+        </p:txBody>
+      </p:sp>
     </p:spTree>
     <p:extLst>
       <p:ext uri="{BB962C8B-B14F-4D97-AF65-F5344CB8AC3E}">
@@ -12347,32 +12841,10 @@
           <a:bodyPr/>
           <a:lstStyle/>
           <a:p>
-            <a:endParaRPr lang="en-US"/>
-          </a:p>
-        </p:txBody>
-      </p:sp>
-      <p:sp>
-        <p:nvSpPr>
-          <p:cNvPr id="4" name="Content Placeholder 3">
-            <a:extLst>
-              <a:ext uri="{FF2B5EF4-FFF2-40B4-BE49-F238E27FC236}">
-                <a16:creationId xmlns:a16="http://schemas.microsoft.com/office/drawing/2014/main" id="{8EFC2A4D-2CA7-8D15-A80B-1DD8B08383CD}"/>
-              </a:ext>
-            </a:extLst>
-          </p:cNvPr>
-          <p:cNvSpPr>
-            <a:spLocks noGrp="1"/>
-          </p:cNvSpPr>
-          <p:nvPr>
-            <p:ph idx="1"/>
-          </p:nvPr>
-        </p:nvSpPr>
-        <p:spPr/>
-        <p:txBody>
-          <a:bodyPr/>
-          <a:lstStyle/>
-          <a:p>
-            <a:endParaRPr lang="en-US"/>
+            <a:r>
+              <a:rPr lang="en-US" dirty="0"/>
+              <a:t>Kinematic Graphs</a:t>
+            </a:r>
           </a:p>
         </p:txBody>
       </p:sp>
@@ -12434,8 +12906,8 @@
         </p:blipFill>
         <p:spPr bwMode="auto">
           <a:xfrm>
-            <a:off x="914400" y="1237914"/>
-            <a:ext cx="7315200" cy="4832349"/>
+            <a:off x="742949" y="1124751"/>
+            <a:ext cx="7772400" cy="5134371"/>
           </a:xfrm>
           <a:prstGeom prst="rect">
             <a:avLst/>

</xml_diff>

<commit_message>
Finished Act 6 Code
</commit_message>
<xml_diff>
--- a/05 Video Processing/Activity 5 - Video Processing.pptx
+++ b/05 Video Processing/Activity 5 - Video Processing.pptx
@@ -5,7 +5,7 @@
     <p:sldMasterId id="2147483660" r:id="rId1"/>
   </p:sldMasterIdLst>
   <p:notesMasterIdLst>
-    <p:notesMasterId r:id="rId12"/>
+    <p:notesMasterId r:id="rId13"/>
   </p:notesMasterIdLst>
   <p:sldIdLst>
     <p:sldId id="256" r:id="rId2"/>
@@ -17,7 +17,8 @@
     <p:sldId id="279" r:id="rId8"/>
     <p:sldId id="280" r:id="rId9"/>
     <p:sldId id="281" r:id="rId10"/>
-    <p:sldId id="275" r:id="rId11"/>
+    <p:sldId id="282" r:id="rId11"/>
+    <p:sldId id="275" r:id="rId12"/>
   </p:sldIdLst>
   <p:sldSz cx="9144000" cy="6858000" type="screen4x3"/>
   <p:notesSz cx="6858000" cy="9144000"/>
@@ -2783,7 +2784,7 @@
           <a:p>
             <a:fld id="{5C1B11F4-4A81-4A1F-8746-8659FC968F94}" type="datetimeFigureOut">
               <a:rPr lang="en-US" smtClean="0"/>
-              <a:t>6/8/2022</a:t>
+              <a:t>6/9/2022</a:t>
             </a:fld>
             <a:endParaRPr lang="en-US"/>
           </a:p>
@@ -10015,6 +10016,286 @@
       </p:grpSpPr>
       <p:sp>
         <p:nvSpPr>
+          <p:cNvPr id="2" name="Title 1">
+            <a:extLst>
+              <a:ext uri="{FF2B5EF4-FFF2-40B4-BE49-F238E27FC236}">
+                <a16:creationId xmlns:a16="http://schemas.microsoft.com/office/drawing/2014/main" id="{09643F27-E457-18BC-5C3E-AE2189273C4D}"/>
+              </a:ext>
+            </a:extLst>
+          </p:cNvPr>
+          <p:cNvSpPr>
+            <a:spLocks noGrp="1"/>
+          </p:cNvSpPr>
+          <p:nvPr>
+            <p:ph type="title"/>
+          </p:nvPr>
+        </p:nvSpPr>
+        <p:spPr/>
+        <p:txBody>
+          <a:bodyPr/>
+          <a:lstStyle/>
+          <a:p>
+            <a:r>
+              <a:rPr lang="en-US" dirty="0"/>
+              <a:t>Optical Flow</a:t>
+            </a:r>
+          </a:p>
+        </p:txBody>
+      </p:sp>
+      <p:sp>
+        <p:nvSpPr>
+          <p:cNvPr id="3" name="Footer Placeholder 2">
+            <a:extLst>
+              <a:ext uri="{FF2B5EF4-FFF2-40B4-BE49-F238E27FC236}">
+                <a16:creationId xmlns:a16="http://schemas.microsoft.com/office/drawing/2014/main" id="{BAA3EBE0-16DD-3A46-A842-2F8AD933967D}"/>
+              </a:ext>
+            </a:extLst>
+          </p:cNvPr>
+          <p:cNvSpPr>
+            <a:spLocks noGrp="1"/>
+          </p:cNvSpPr>
+          <p:nvPr>
+            <p:ph type="ftr" sz="quarter" idx="11"/>
+          </p:nvPr>
+        </p:nvSpPr>
+        <p:spPr/>
+        <p:txBody>
+          <a:bodyPr/>
+          <a:lstStyle/>
+          <a:p>
+            <a:r>
+              <a:rPr lang="en-US"/>
+              <a:t>Physics 301 - Advanced Signal and Image Processing</a:t>
+            </a:r>
+          </a:p>
+        </p:txBody>
+      </p:sp>
+      <p:sp>
+        <p:nvSpPr>
+          <p:cNvPr id="4" name="Slide Number Placeholder 3">
+            <a:extLst>
+              <a:ext uri="{FF2B5EF4-FFF2-40B4-BE49-F238E27FC236}">
+                <a16:creationId xmlns:a16="http://schemas.microsoft.com/office/drawing/2014/main" id="{52104370-54D8-D490-1288-8CDBC0DBEAFC}"/>
+              </a:ext>
+            </a:extLst>
+          </p:cNvPr>
+          <p:cNvSpPr>
+            <a:spLocks noGrp="1"/>
+          </p:cNvSpPr>
+          <p:nvPr>
+            <p:ph type="sldNum" sz="quarter" idx="12"/>
+          </p:nvPr>
+        </p:nvSpPr>
+        <p:spPr/>
+        <p:txBody>
+          <a:bodyPr/>
+          <a:lstStyle/>
+          <a:p>
+            <a:fld id="{8262CFD8-7A98-47E6-A2CC-B17DDA24BA0E}" type="slidenum">
+              <a:rPr lang="en-US" smtClean="0"/>
+              <a:t>10</a:t>
+            </a:fld>
+            <a:endParaRPr lang="en-US"/>
+          </a:p>
+        </p:txBody>
+      </p:sp>
+      <p:pic>
+        <p:nvPicPr>
+          <p:cNvPr id="1026" name="Picture 2">
+            <a:extLst>
+              <a:ext uri="{FF2B5EF4-FFF2-40B4-BE49-F238E27FC236}">
+                <a16:creationId xmlns:a16="http://schemas.microsoft.com/office/drawing/2014/main" id="{F580242D-EED1-A6BA-C1F2-703429CD66A9}"/>
+              </a:ext>
+            </a:extLst>
+          </p:cNvPr>
+          <p:cNvPicPr>
+            <a:picLocks noChangeAspect="1" noChangeArrowheads="1"/>
+          </p:cNvPicPr>
+          <p:nvPr/>
+        </p:nvPicPr>
+        <p:blipFill>
+          <a:blip r:embed="rId2">
+            <a:extLst>
+              <a:ext uri="{28A0092B-C50C-407E-A947-70E740481C1C}">
+                <a14:useLocalDpi xmlns:a14="http://schemas.microsoft.com/office/drawing/2010/main" val="0"/>
+              </a:ext>
+            </a:extLst>
+          </a:blip>
+          <a:srcRect/>
+          <a:stretch>
+            <a:fillRect/>
+          </a:stretch>
+        </p:blipFill>
+        <p:spPr bwMode="auto">
+          <a:xfrm>
+            <a:off x="457200" y="1246957"/>
+            <a:ext cx="8229600" cy="1590199"/>
+          </a:xfrm>
+          <a:prstGeom prst="rect">
+            <a:avLst/>
+          </a:prstGeom>
+          <a:noFill/>
+          <a:extLst>
+            <a:ext uri="{909E8E84-426E-40DD-AFC4-6F175D3DCCD1}">
+              <a14:hiddenFill xmlns:a14="http://schemas.microsoft.com/office/drawing/2010/main">
+                <a:solidFill>
+                  <a:srgbClr val="FFFFFF"/>
+                </a:solidFill>
+              </a14:hiddenFill>
+            </a:ext>
+          </a:extLst>
+        </p:spPr>
+      </p:pic>
+      <p:pic>
+        <p:nvPicPr>
+          <p:cNvPr id="6" name="Picture 5">
+            <a:extLst>
+              <a:ext uri="{FF2B5EF4-FFF2-40B4-BE49-F238E27FC236}">
+                <a16:creationId xmlns:a16="http://schemas.microsoft.com/office/drawing/2014/main" id="{BE0593C0-660C-A9C2-C1B5-B834E0CEB327}"/>
+              </a:ext>
+            </a:extLst>
+          </p:cNvPr>
+          <p:cNvPicPr>
+            <a:picLocks noChangeAspect="1"/>
+          </p:cNvPicPr>
+          <p:nvPr/>
+        </p:nvPicPr>
+        <p:blipFill rotWithShape="1">
+          <a:blip r:embed="rId3"/>
+          <a:srcRect t="5717" b="5717"/>
+          <a:stretch/>
+        </p:blipFill>
+        <p:spPr>
+          <a:xfrm>
+            <a:off x="4857749" y="3709135"/>
+            <a:ext cx="3657600" cy="2438400"/>
+          </a:xfrm>
+          <a:prstGeom prst="rect">
+            <a:avLst/>
+          </a:prstGeom>
+        </p:spPr>
+      </p:pic>
+      <p:sp>
+        <p:nvSpPr>
+          <p:cNvPr id="8" name="Title 1">
+            <a:extLst>
+              <a:ext uri="{FF2B5EF4-FFF2-40B4-BE49-F238E27FC236}">
+                <a16:creationId xmlns:a16="http://schemas.microsoft.com/office/drawing/2014/main" id="{ADFE7B0F-FC2D-61C2-ED05-BF9BBF71D10D}"/>
+              </a:ext>
+            </a:extLst>
+          </p:cNvPr>
+          <p:cNvSpPr txBox="1">
+            <a:spLocks/>
+          </p:cNvSpPr>
+          <p:nvPr/>
+        </p:nvSpPr>
+        <p:spPr>
+          <a:xfrm>
+            <a:off x="628649" y="2837924"/>
+            <a:ext cx="7886700" cy="662396"/>
+          </a:xfrm>
+          <a:prstGeom prst="rect">
+            <a:avLst/>
+          </a:prstGeom>
+          <a:effectLst/>
+        </p:spPr>
+        <p:txBody>
+          <a:bodyPr vert="horz" lIns="91440" tIns="45720" rIns="91440" bIns="45720" rtlCol="0" anchor="ctr">
+            <a:noAutofit/>
+          </a:bodyPr>
+          <a:lstStyle>
+            <a:lvl1pPr algn="l" defTabSz="914400" rtl="0" eaLnBrk="1" latinLnBrk="0" hangingPunct="1">
+              <a:lnSpc>
+                <a:spcPct val="90000"/>
+              </a:lnSpc>
+              <a:spcBef>
+                <a:spcPct val="0"/>
+              </a:spcBef>
+              <a:buNone/>
+              <a:defRPr sz="6000" kern="1200" spc="-300">
+                <a:solidFill>
+                  <a:srgbClr val="D64045"/>
+                </a:solidFill>
+                <a:effectLst>
+                  <a:outerShdw dist="38100" dir="8100000" algn="tr" rotWithShape="0">
+                    <a:srgbClr val="467599"/>
+                  </a:outerShdw>
+                </a:effectLst>
+                <a:latin typeface="Bahnschrift SemiBold" panose="020B0502040204020203" pitchFamily="34" charset="0"/>
+                <a:ea typeface="+mj-ea"/>
+                <a:cs typeface="+mj-cs"/>
+              </a:defRPr>
+            </a:lvl1pPr>
+          </a:lstStyle>
+          <a:p>
+            <a:r>
+              <a:rPr lang="en-US" dirty="0"/>
+              <a:t>Face Detection</a:t>
+            </a:r>
+          </a:p>
+        </p:txBody>
+      </p:sp>
+      <p:pic>
+        <p:nvPicPr>
+          <p:cNvPr id="9" name="Picture 8">
+            <a:extLst>
+              <a:ext uri="{FF2B5EF4-FFF2-40B4-BE49-F238E27FC236}">
+                <a16:creationId xmlns:a16="http://schemas.microsoft.com/office/drawing/2014/main" id="{45725400-75ED-43CB-3CE5-E8879F51D5DF}"/>
+              </a:ext>
+            </a:extLst>
+          </p:cNvPr>
+          <p:cNvPicPr>
+            <a:picLocks noChangeAspect="1"/>
+          </p:cNvPicPr>
+          <p:nvPr/>
+        </p:nvPicPr>
+        <p:blipFill rotWithShape="1">
+          <a:blip r:embed="rId4"/>
+          <a:srcRect t="5717" b="5717"/>
+          <a:stretch/>
+        </p:blipFill>
+        <p:spPr>
+          <a:xfrm>
+            <a:off x="914399" y="3709135"/>
+            <a:ext cx="3657600" cy="2438400"/>
+          </a:xfrm>
+          <a:prstGeom prst="rect">
+            <a:avLst/>
+          </a:prstGeom>
+        </p:spPr>
+      </p:pic>
+    </p:spTree>
+    <p:extLst>
+      <p:ext uri="{BB962C8B-B14F-4D97-AF65-F5344CB8AC3E}">
+        <p14:creationId xmlns:p14="http://schemas.microsoft.com/office/powerpoint/2010/main" val="1656304418"/>
+      </p:ext>
+    </p:extLst>
+  </p:cSld>
+  <p:clrMapOvr>
+    <a:masterClrMapping/>
+  </p:clrMapOvr>
+</p:sld>
+</file>
+
+<file path=ppt/slides/slide11.xml><?xml version="1.0" encoding="utf-8"?>
+<p:sld xmlns:a="http://schemas.openxmlformats.org/drawingml/2006/main" xmlns:r="http://schemas.openxmlformats.org/officeDocument/2006/relationships" xmlns:p="http://schemas.openxmlformats.org/presentationml/2006/main">
+  <p:cSld>
+    <p:spTree>
+      <p:nvGrpSpPr>
+        <p:cNvPr id="1" name=""/>
+        <p:cNvGrpSpPr/>
+        <p:nvPr/>
+      </p:nvGrpSpPr>
+      <p:grpSpPr>
+        <a:xfrm>
+          <a:off x="0" y="0"/>
+          <a:ext cx="0" cy="0"/>
+          <a:chOff x="0" y="0"/>
+          <a:chExt cx="0" cy="0"/>
+        </a:xfrm>
+      </p:grpSpPr>
+      <p:sp>
+        <p:nvSpPr>
           <p:cNvPr id="5" name="Text Placeholder 4">
             <a:extLst>
               <a:ext uri="{FF2B5EF4-FFF2-40B4-BE49-F238E27FC236}">
@@ -10157,7 +10438,7 @@
           <a:p>
             <a:fld id="{8262CFD8-7A98-47E6-A2CC-B17DDA24BA0E}" type="slidenum">
               <a:rPr lang="en-US" smtClean="0"/>
-              <a:t>10</a:t>
+              <a:t>11</a:t>
             </a:fld>
             <a:endParaRPr lang="en-US"/>
           </a:p>
@@ -10484,13 +10765,13 @@
               <a:rPr lang="en-US" dirty="0">
                 <a:hlinkClick r:id="rId7"/>
               </a:rPr>
-              <a:t>Physics-301/Activity - 4 RGB-to-Spectra using </a:t>
+              <a:t>Physics-301/Activity 05 - Basic Video </a:t>
             </a:r>
             <a:r>
               <a:rPr lang="en-US" dirty="0" err="1">
                 <a:hlinkClick r:id="rId7"/>
               </a:rPr>
-              <a:t>PCA.ipynb</a:t>
+              <a:t>Processing.ipynb</a:t>
             </a:r>
             <a:r>
               <a:rPr lang="en-US" dirty="0">
@@ -10517,7 +10798,7 @@
               <a:rPr lang="en-US" dirty="0">
                 <a:hlinkClick r:id="rId8"/>
               </a:rPr>
-              <a:t>https://drive.google.com/file/d/11YbzA_dpg4L-_9xB1E44XnfDiXXtFVsc/view?usp=sharing</a:t>
+              <a:t>https://drive.google.com/file/d/1S1juRZtkc_vtyp8Ffvfp62fFIImtMSSb/view?usp=sharing</a:t>
             </a:r>
             <a:r>
               <a:rPr lang="en-US" dirty="0"/>

</xml_diff>

<commit_message>
Started Act 8 Report
</commit_message>
<xml_diff>
--- a/05 Video Processing/Activity 5 - Video Processing.pptx
+++ b/05 Video Processing/Activity 5 - Video Processing.pptx
@@ -3196,9 +3196,14 @@
             <a:pPr algn="l"/>
             <a:r>
               <a:rPr lang="en-PH" sz="8000" spc="600" baseline="0" dirty="0">
-                <a:solidFill>
-                  <a:srgbClr val="D64045"/>
-                </a:solidFill>
+                <a:pattFill prst="dotGrid">
+                  <a:fgClr>
+                    <a:srgbClr val="FFEE9E"/>
+                  </a:fgClr>
+                  <a:bgClr>
+                    <a:srgbClr val="D64045"/>
+                  </a:bgClr>
+                </a:pattFill>
                 <a:effectLst>
                   <a:outerShdw dist="38100" dir="9600000" algn="r" rotWithShape="0">
                     <a:prstClr val="black"/>
@@ -3459,9 +3464,14 @@
             <a:pPr algn="l"/>
             <a:r>
               <a:rPr lang="en-PH" sz="16600" spc="2000" baseline="0" dirty="0">
-                <a:solidFill>
-                  <a:srgbClr val="467599"/>
-                </a:solidFill>
+                <a:pattFill prst="lgGrid">
+                  <a:fgClr>
+                    <a:srgbClr val="EBA0A2"/>
+                  </a:fgClr>
+                  <a:bgClr>
+                    <a:srgbClr val="467599"/>
+                  </a:bgClr>
+                </a:pattFill>
                 <a:effectLst>
                   <a:outerShdw dist="38100" dir="9600000" algn="r" rotWithShape="0">
                     <a:prstClr val="black"/>
@@ -3474,9 +3484,14 @@
               <a:t>VIDEO</a:t>
             </a:r>
             <a:endParaRPr lang="en-PH" sz="13800" spc="2000" baseline="0" dirty="0">
-              <a:solidFill>
-                <a:srgbClr val="467599"/>
-              </a:solidFill>
+              <a:pattFill prst="lgGrid">
+                <a:fgClr>
+                  <a:srgbClr val="EBA0A2"/>
+                </a:fgClr>
+                <a:bgClr>
+                  <a:srgbClr val="467599"/>
+                </a:bgClr>
+              </a:pattFill>
               <a:effectLst>
                 <a:outerShdw dist="38100" dir="9600000" algn="r" rotWithShape="0">
                   <a:prstClr val="black"/>
@@ -5743,7 +5758,7 @@
         <p:fade/>
       </p:transition>
     </mc:Choice>
-    <mc:Fallback xmlns="" xmlns:mv="urn:schemas-microsoft-com:mac:vml" xmlns:c="http://schemas.openxmlformats.org/drawingml/2006/chart" xmlns:dgm="http://schemas.openxmlformats.org/drawingml/2006/diagram" xmlns:o="urn:schemas-microsoft-com:office:office" xmlns:v="urn:schemas-microsoft-com:vml" xmlns:pvml="urn:schemas-microsoft-com:office:powerpoint" xmlns:com="http://schemas.openxmlformats.org/drawingml/2006/compatibility" xmlns:p15="http://schemas.microsoft.com/office/powerpoint/2012/main" xmlns:ahyp="http://schemas.microsoft.com/office/drawing/2018/hyperlinkcolor">
+    <mc:Fallback xmlns:ahyp="http://schemas.microsoft.com/office/drawing/2018/hyperlinkcolor" xmlns:p15="http://schemas.microsoft.com/office/powerpoint/2012/main" xmlns:com="http://schemas.openxmlformats.org/drawingml/2006/compatibility" xmlns:pvml="urn:schemas-microsoft-com:office:powerpoint" xmlns:v="urn:schemas-microsoft-com:vml" xmlns:o="urn:schemas-microsoft-com:office:office" xmlns:dgm="http://schemas.openxmlformats.org/drawingml/2006/diagram" xmlns:c="http://schemas.openxmlformats.org/drawingml/2006/chart" xmlns:mv="urn:schemas-microsoft-com:mac:vml" xmlns="">
       <p:transition>
         <p:fade/>
       </p:transition>
@@ -7052,7 +7067,7 @@
         <p:fade/>
       </p:transition>
     </mc:Choice>
-    <mc:Fallback xmlns:ahyp="http://schemas.microsoft.com/office/drawing/2018/hyperlinkcolor" xmlns:p15="http://schemas.microsoft.com/office/powerpoint/2012/main" xmlns:com="http://schemas.openxmlformats.org/drawingml/2006/compatibility" xmlns:pvml="urn:schemas-microsoft-com:office:powerpoint" xmlns:v="urn:schemas-microsoft-com:vml" xmlns:o="urn:schemas-microsoft-com:office:office" xmlns:dgm="http://schemas.openxmlformats.org/drawingml/2006/diagram" xmlns:c="http://schemas.openxmlformats.org/drawingml/2006/chart" xmlns:mv="urn:schemas-microsoft-com:mac:vml" xmlns="">
+    <mc:Fallback xmlns="" xmlns:mv="urn:schemas-microsoft-com:mac:vml" xmlns:c="http://schemas.openxmlformats.org/drawingml/2006/chart" xmlns:dgm="http://schemas.openxmlformats.org/drawingml/2006/diagram" xmlns:o="urn:schemas-microsoft-com:office:office" xmlns:v="urn:schemas-microsoft-com:vml" xmlns:pvml="urn:schemas-microsoft-com:office:powerpoint" xmlns:com="http://schemas.openxmlformats.org/drawingml/2006/compatibility" xmlns:p15="http://schemas.microsoft.com/office/powerpoint/2012/main" xmlns:ahyp="http://schemas.microsoft.com/office/drawing/2018/hyperlinkcolor">
       <p:transition>
         <p:fade/>
       </p:transition>
@@ -7105,7 +7120,7 @@
         <p:spPr>
           <a:xfrm>
             <a:off x="628649" y="1325161"/>
-            <a:ext cx="8058151" cy="2137701"/>
+            <a:ext cx="8058151" cy="2593121"/>
           </a:xfrm>
           <a:prstGeom prst="rect">
             <a:avLst/>
@@ -7539,8 +7554,8 @@
         </p:nvSpPr>
         <p:spPr>
           <a:xfrm>
-            <a:off x="628649" y="4218650"/>
-            <a:ext cx="8058152" cy="2046387"/>
+            <a:off x="628649" y="4854804"/>
+            <a:ext cx="8058152" cy="1410233"/>
           </a:xfrm>
           <a:prstGeom prst="rect">
             <a:avLst/>
@@ -7764,7 +7779,7 @@
         </p:nvGrpSpPr>
         <p:grpSpPr>
           <a:xfrm>
-            <a:off x="457200" y="3207152"/>
+            <a:off x="457200" y="3763335"/>
             <a:ext cx="5773918" cy="1057912"/>
             <a:chOff x="457200" y="3196343"/>
             <a:chExt cx="5773918" cy="1057912"/>
@@ -8128,7 +8143,7 @@
         <p:fade/>
       </p:transition>
     </mc:Choice>
-    <mc:Fallback xmlns:ahyp="http://schemas.microsoft.com/office/drawing/2018/hyperlinkcolor" xmlns:p15="http://schemas.microsoft.com/office/powerpoint/2012/main" xmlns:com="http://schemas.openxmlformats.org/drawingml/2006/compatibility" xmlns:pvml="urn:schemas-microsoft-com:office:powerpoint" xmlns:v="urn:schemas-microsoft-com:vml" xmlns:o="urn:schemas-microsoft-com:office:office" xmlns:dgm="http://schemas.openxmlformats.org/drawingml/2006/diagram" xmlns:c="http://schemas.openxmlformats.org/drawingml/2006/chart" xmlns:mv="urn:schemas-microsoft-com:mac:vml" xmlns="">
+    <mc:Fallback xmlns="" xmlns:mv="urn:schemas-microsoft-com:mac:vml" xmlns:c="http://schemas.openxmlformats.org/drawingml/2006/chart" xmlns:dgm="http://schemas.openxmlformats.org/drawingml/2006/diagram" xmlns:o="urn:schemas-microsoft-com:office:office" xmlns:v="urn:schemas-microsoft-com:vml" xmlns:pvml="urn:schemas-microsoft-com:office:powerpoint" xmlns:com="http://schemas.openxmlformats.org/drawingml/2006/compatibility" xmlns:p15="http://schemas.microsoft.com/office/powerpoint/2012/main" xmlns:ahyp="http://schemas.microsoft.com/office/drawing/2018/hyperlinkcolor">
       <p:transition>
         <p:fade/>
       </p:transition>
@@ -10319,12 +10334,12 @@
               <a:buNone/>
             </a:pPr>
             <a:r>
+              <a:rPr lang="en-US" dirty="0"/>
+              <a:t>This activity was quite challenging since it deals with non-static data. I took me a while to realize the webcam that I used webcam had auto-white balancing but eventually, it was satisfying to see my code run smoothly and live-track a moving object. In addition, I was able to perform a staple kinematics experiment without having to use the usual motion sensor that’s only available in the school premises. Lastly, we we’re able to apply the optical flow [6] and face detection [7] counterparts on python using Open-CV which opens an endless number of potential applications. I’d like to give credit to Kenneth Domingo for the pre-recorded video of the free-falling ball which I again used in this report. I think I gave out decent visualizations of the tracking process and </a:t>
+            </a:r>
+            <a:r>
               <a:rPr lang="en-US" sz="1400" dirty="0"/>
-              <a:t>As mentioned previously, </a:t>
-            </a:r>
-            <a:r>
-              <a:rPr lang="en-US" dirty="0"/>
-              <a:t>I have used PCA before in spectral resolution but in this report, I was able to compare how the method fared across all different light sources. The visualizations were stand-alone and self-explanatory. One important finding is that it turns out, the skewed power distribution contributed to rendering spectra with large color difference. The take-away here is the same as what my undergraduate thesis proposed; we should implement both spectral and color error metrics to evaluate the spectral reconstruction. </a:t>
+              <a:t>discussed the nuances in the observations.  </a:t>
             </a:r>
           </a:p>
           <a:p>
@@ -10333,7 +10348,7 @@
             </a:pPr>
             <a:r>
               <a:rPr lang="en-US" sz="1400" dirty="0"/>
-              <a:t>In this activity, I’d give myself a score of </a:t>
+              <a:t>With that said, I’d give myself a score of </a:t>
             </a:r>
             <a:r>
               <a:rPr lang="en-US" sz="2000" dirty="0">
@@ -10462,8 +10477,8 @@
         </p:nvSpPr>
         <p:spPr>
           <a:xfrm>
-            <a:off x="628649" y="4218650"/>
-            <a:ext cx="8058151" cy="2046387"/>
+            <a:off x="628648" y="4814164"/>
+            <a:ext cx="8515351" cy="1410233"/>
           </a:xfrm>
         </p:spPr>
         <p:txBody>
@@ -10533,6 +10548,32 @@
                 <a:hlinkClick r:id="rId4"/>
               </a:rPr>
               <a:t>Basic Video Processing (rlprincipe.wixsite.com)</a:t>
+            </a:r>
+            <a:endParaRPr lang="en-US" dirty="0"/>
+          </a:p>
+          <a:p>
+            <a:r>
+              <a:rPr lang="en-US" dirty="0"/>
+              <a:t>[6] </a:t>
+            </a:r>
+            <a:r>
+              <a:rPr lang="en-US" dirty="0">
+                <a:hlinkClick r:id="rId5"/>
+              </a:rPr>
+              <a:t>OpenCV: Optical Flow</a:t>
+            </a:r>
+            <a:endParaRPr lang="en-US" dirty="0"/>
+          </a:p>
+          <a:p>
+            <a:r>
+              <a:rPr lang="en-US" dirty="0"/>
+              <a:t>[7] </a:t>
+            </a:r>
+            <a:r>
+              <a:rPr lang="en-US" dirty="0">
+                <a:hlinkClick r:id="rId6"/>
+              </a:rPr>
+              <a:t>Face Detection in 2 Minutes using OpenCV &amp; Python | by Adarsh Menon | Towards Data Science</a:t>
             </a:r>
             <a:endParaRPr lang="en-US" dirty="0"/>
           </a:p>
@@ -10557,7 +10598,7 @@
         <p:fade/>
       </p:transition>
     </mc:Choice>
-    <mc:Fallback xmlns:ahyp="http://schemas.microsoft.com/office/drawing/2018/hyperlinkcolor" xmlns:p15="http://schemas.microsoft.com/office/powerpoint/2012/main" xmlns:com="http://schemas.openxmlformats.org/drawingml/2006/compatibility" xmlns:pvml="urn:schemas-microsoft-com:office:powerpoint" xmlns:v="urn:schemas-microsoft-com:vml" xmlns:o="urn:schemas-microsoft-com:office:office" xmlns:dgm="http://schemas.openxmlformats.org/drawingml/2006/diagram" xmlns:c="http://schemas.openxmlformats.org/drawingml/2006/chart" xmlns:mv="urn:schemas-microsoft-com:mac:vml" xmlns="">
+    <mc:Fallback xmlns="" xmlns:mv="urn:schemas-microsoft-com:mac:vml" xmlns:c="http://schemas.openxmlformats.org/drawingml/2006/chart" xmlns:dgm="http://schemas.openxmlformats.org/drawingml/2006/diagram" xmlns:o="urn:schemas-microsoft-com:office:office" xmlns:v="urn:schemas-microsoft-com:vml" xmlns:pvml="urn:schemas-microsoft-com:office:powerpoint" xmlns:com="http://schemas.openxmlformats.org/drawingml/2006/compatibility" xmlns:p15="http://schemas.microsoft.com/office/powerpoint/2012/main" xmlns:ahyp="http://schemas.microsoft.com/office/drawing/2018/hyperlinkcolor">
       <p:transition>
         <p:fade/>
       </p:transition>
@@ -10596,7 +10637,7 @@
           <p:nvPr>
             <p:extLst>
               <p:ext uri="{D42A27DB-BD31-4B8C-83A1-F6EECF244321}">
-                <p14:modId xmlns:p14="http://schemas.microsoft.com/office/powerpoint/2010/main" val="181023681"/>
+                <p14:modId xmlns:p14="http://schemas.microsoft.com/office/powerpoint/2010/main" val="1814234368"/>
               </p:ext>
             </p:extLst>
           </p:nvPr>
@@ -10717,25 +10758,25 @@
         <p:spPr/>
         <p:txBody>
           <a:bodyPr>
-            <a:normAutofit/>
+            <a:normAutofit lnSpcReduction="10000"/>
           </a:bodyPr>
           <a:lstStyle/>
           <a:p>
             <a:r>
               <a:rPr lang="en-US" dirty="0"/>
-              <a:t>1</a:t>
+              <a:t>Image processing techniques can be applied on videos which are essentially a series of still images.</a:t>
             </a:r>
           </a:p>
           <a:p>
             <a:r>
               <a:rPr lang="en-US" dirty="0"/>
-              <a:t>2</a:t>
+              <a:t>Motion has three spatial dimensions and the fourth one is time. Non-coplanar motion and low sampling rate (fps) would affect the quality tracking.</a:t>
             </a:r>
           </a:p>
           <a:p>
             <a:r>
               <a:rPr lang="en-US" dirty="0"/>
-              <a:t>3</a:t>
+              <a:t>Tracking based on color is easy but unreliable especially with the auto white-balance built in latest camera models.</a:t>
             </a:r>
           </a:p>
         </p:txBody>
@@ -10823,7 +10864,7 @@
         <p:fade/>
       </p:transition>
     </mc:Choice>
-    <mc:Fallback xmlns="" xmlns:mv="urn:schemas-microsoft-com:mac:vml" xmlns:c="http://schemas.openxmlformats.org/drawingml/2006/chart" xmlns:dgm="http://schemas.openxmlformats.org/drawingml/2006/diagram" xmlns:o="urn:schemas-microsoft-com:office:office" xmlns:v="urn:schemas-microsoft-com:vml" xmlns:pvml="urn:schemas-microsoft-com:office:powerpoint" xmlns:com="http://schemas.openxmlformats.org/drawingml/2006/compatibility" xmlns:p15="http://schemas.microsoft.com/office/powerpoint/2012/main" xmlns:ahyp="http://schemas.microsoft.com/office/drawing/2018/hyperlinkcolor">
+    <mc:Fallback xmlns:ahyp="http://schemas.microsoft.com/office/drawing/2018/hyperlinkcolor" xmlns:p15="http://schemas.microsoft.com/office/powerpoint/2012/main" xmlns:com="http://schemas.openxmlformats.org/drawingml/2006/compatibility" xmlns:pvml="urn:schemas-microsoft-com:office:powerpoint" xmlns:v="urn:schemas-microsoft-com:vml" xmlns:o="urn:schemas-microsoft-com:office:office" xmlns:dgm="http://schemas.openxmlformats.org/drawingml/2006/diagram" xmlns:c="http://schemas.openxmlformats.org/drawingml/2006/chart" xmlns:mv="urn:schemas-microsoft-com:mac:vml" xmlns="">
       <p:transition>
         <p:fade/>
       </p:transition>
@@ -11466,10 +11507,10 @@
       </p:sp>
       <p:pic>
         <p:nvPicPr>
-          <p:cNvPr id="2050" name="Picture 2">
+          <p:cNvPr id="1026" name="Picture 2">
             <a:extLst>
               <a:ext uri="{FF2B5EF4-FFF2-40B4-BE49-F238E27FC236}">
-                <a16:creationId xmlns:a16="http://schemas.microsoft.com/office/drawing/2014/main" id="{680734A3-55AC-BB67-B596-4F6B50B00E56}"/>
+                <a16:creationId xmlns:a16="http://schemas.microsoft.com/office/drawing/2014/main" id="{B4D87A41-A94F-F8C4-BF9F-9834A6054F66}"/>
               </a:ext>
             </a:extLst>
           </p:cNvPr>
@@ -11493,8 +11534,8 @@
         </p:blipFill>
         <p:spPr bwMode="auto">
           <a:xfrm>
-            <a:off x="1371600" y="3833336"/>
-            <a:ext cx="6400800" cy="2343627"/>
+            <a:off x="1371600" y="3833337"/>
+            <a:ext cx="6400800" cy="2343626"/>
           </a:xfrm>
           <a:prstGeom prst="rect">
             <a:avLst/>
@@ -11624,13 +11665,14 @@
             </a:pPr>
             <a:r>
               <a:rPr lang="en-US" sz="1800" dirty="0"/>
-              <a:t>From the webcam live feed, we first took 100 frames, segmented each image, and then stored the centroid coordinates. Shown below are some snapshots at different time frames while I move the object sinusoidally.</a:t>
-            </a:r>
-          </a:p>
-          <a:p>
-            <a:pPr marL="0" indent="0" algn="ctr">
-              <a:buNone/>
-            </a:pPr>
+              <a:t>From the webcam live feed, we first took 100 frames, segmented each image, and then stored the centroid coordinates. Shown below are some snapshots at different time frames while I move the object sinusoidally. </a:t>
+            </a:r>
+            <a:br>
+              <a:rPr lang="en-US" sz="1800" dirty="0"/>
+            </a:br>
+            <a:br>
+              <a:rPr lang="en-US" sz="1800" dirty="0"/>
+            </a:br>
             <a:r>
               <a:rPr lang="en-US" sz="1800" dirty="0">
                 <a:highlight>
@@ -11638,7 +11680,7 @@
                 </a:highlight>
                 <a:latin typeface="Bahnschrift SemiBold" panose="020B0502040204020203" pitchFamily="34" charset="0"/>
               </a:rPr>
-              <a:t>	FRAME 1					FRAME 25                  </a:t>
+              <a:t>	FRAME 22				FRAME 44                 </a:t>
             </a:r>
             <a:r>
               <a:rPr lang="en-US" sz="1800" dirty="0">
@@ -11652,11 +11694,61 @@
               </a:rPr>
               <a:t>.</a:t>
             </a:r>
-          </a:p>
-          <a:p>
-            <a:pPr marL="0" indent="0">
-              <a:buNone/>
-            </a:pPr>
+            <a:br>
+              <a:rPr lang="en-US" sz="1800" dirty="0">
+                <a:solidFill>
+                  <a:srgbClr val="FFEE9E"/>
+                </a:solidFill>
+                <a:highlight>
+                  <a:srgbClr val="FFEE9E"/>
+                </a:highlight>
+                <a:latin typeface="Bahnschrift SemiBold" panose="020B0502040204020203" pitchFamily="34" charset="0"/>
+              </a:rPr>
+            </a:br>
+            <a:br>
+              <a:rPr lang="en-US" sz="1800" dirty="0">
+                <a:solidFill>
+                  <a:srgbClr val="FFEE9E"/>
+                </a:solidFill>
+                <a:highlight>
+                  <a:srgbClr val="FFEE9E"/>
+                </a:highlight>
+                <a:latin typeface="Bahnschrift SemiBold" panose="020B0502040204020203" pitchFamily="34" charset="0"/>
+              </a:rPr>
+            </a:br>
+            <a:br>
+              <a:rPr lang="en-US" sz="1800" dirty="0">
+                <a:solidFill>
+                  <a:srgbClr val="FFEE9E"/>
+                </a:solidFill>
+                <a:highlight>
+                  <a:srgbClr val="FFEE9E"/>
+                </a:highlight>
+                <a:latin typeface="Bahnschrift SemiBold" panose="020B0502040204020203" pitchFamily="34" charset="0"/>
+              </a:rPr>
+            </a:br>
+            <a:br>
+              <a:rPr lang="en-US" sz="1800" dirty="0">
+                <a:solidFill>
+                  <a:srgbClr val="FFEE9E"/>
+                </a:solidFill>
+                <a:highlight>
+                  <a:srgbClr val="FFEE9E"/>
+                </a:highlight>
+                <a:latin typeface="Bahnschrift SemiBold" panose="020B0502040204020203" pitchFamily="34" charset="0"/>
+              </a:rPr>
+            </a:br>
+            <a:br>
+              <a:rPr lang="en-US" sz="1800" dirty="0">
+                <a:solidFill>
+                  <a:srgbClr val="FFEE9E"/>
+                </a:solidFill>
+                <a:highlight>
+                  <a:srgbClr val="FFEE9E"/>
+                </a:highlight>
+                <a:latin typeface="Bahnschrift SemiBold" panose="020B0502040204020203" pitchFamily="34" charset="0"/>
+              </a:rPr>
+            </a:br>
             <a:endParaRPr lang="en-US" sz="1800" dirty="0">
               <a:solidFill>
                 <a:srgbClr val="FFEE9E"/>
@@ -11671,48 +11763,17 @@
             <a:pPr marL="0" indent="0">
               <a:buNone/>
             </a:pPr>
-            <a:endParaRPr lang="en-US" sz="1800" dirty="0">
-              <a:solidFill>
-                <a:srgbClr val="FFEE9E"/>
-              </a:solidFill>
-              <a:highlight>
-                <a:srgbClr val="FFEE9E"/>
-              </a:highlight>
-              <a:latin typeface="Bahnschrift SemiBold" panose="020B0502040204020203" pitchFamily="34" charset="0"/>
-            </a:endParaRPr>
-          </a:p>
-          <a:p>
-            <a:pPr marL="0" indent="0">
-              <a:buNone/>
-            </a:pPr>
-            <a:endParaRPr lang="en-US" sz="1800" dirty="0">
-              <a:solidFill>
-                <a:srgbClr val="FFEE9E"/>
-              </a:solidFill>
-              <a:highlight>
-                <a:srgbClr val="FFEE9E"/>
-              </a:highlight>
-              <a:latin typeface="Bahnschrift SemiBold" panose="020B0502040204020203" pitchFamily="34" charset="0"/>
-            </a:endParaRPr>
-          </a:p>
-          <a:p>
-            <a:pPr marL="0" indent="0">
-              <a:buNone/>
-            </a:pPr>
-            <a:endParaRPr lang="en-US" sz="1800" dirty="0">
-              <a:solidFill>
-                <a:srgbClr val="FFEE9E"/>
-              </a:solidFill>
-              <a:highlight>
-                <a:srgbClr val="FFEE9E"/>
-              </a:highlight>
-              <a:latin typeface="Bahnschrift SemiBold" panose="020B0502040204020203" pitchFamily="34" charset="0"/>
-            </a:endParaRPr>
-          </a:p>
-          <a:p>
-            <a:pPr marL="0" indent="0" algn="ctr">
-              <a:buNone/>
-            </a:pPr>
+            <a:br>
+              <a:rPr lang="en-US" sz="1800" dirty="0">
+                <a:solidFill>
+                  <a:srgbClr val="FFEE9E"/>
+                </a:solidFill>
+                <a:highlight>
+                  <a:srgbClr val="FFEE9E"/>
+                </a:highlight>
+                <a:latin typeface="Bahnschrift SemiBold" panose="020B0502040204020203" pitchFamily="34" charset="0"/>
+              </a:rPr>
+            </a:br>
             <a:r>
               <a:rPr lang="en-US" sz="1800" dirty="0">
                 <a:highlight>
@@ -11720,7 +11781,7 @@
                 </a:highlight>
                 <a:latin typeface="Bahnschrift SemiBold" panose="020B0502040204020203" pitchFamily="34" charset="0"/>
               </a:rPr>
-              <a:t>	FRAME 50				FRAME 75                  </a:t>
+              <a:t>	FRAME 66				FRAME 88                  </a:t>
             </a:r>
             <a:r>
               <a:rPr lang="en-US" sz="1800" dirty="0">
@@ -11788,10 +11849,10 @@
       </p:sp>
       <p:pic>
         <p:nvPicPr>
-          <p:cNvPr id="3074" name="Picture 2">
+          <p:cNvPr id="2058" name="Picture 10">
             <a:extLst>
               <a:ext uri="{FF2B5EF4-FFF2-40B4-BE49-F238E27FC236}">
-                <a16:creationId xmlns:a16="http://schemas.microsoft.com/office/drawing/2014/main" id="{F7BCBFCB-4E78-8C6E-E0A3-7CBA4CCA12D3}"/>
+                <a16:creationId xmlns:a16="http://schemas.microsoft.com/office/drawing/2014/main" id="{C64CC6A5-6D64-E51B-587B-27AB985DA2DD}"/>
               </a:ext>
             </a:extLst>
           </p:cNvPr>
@@ -11815,8 +11876,8 @@
         </p:blipFill>
         <p:spPr bwMode="auto">
           <a:xfrm>
-            <a:off x="0" y="2390106"/>
-            <a:ext cx="4572000" cy="1785258"/>
+            <a:off x="-1" y="2536370"/>
+            <a:ext cx="4572000" cy="1785257"/>
           </a:xfrm>
           <a:prstGeom prst="rect">
             <a:avLst/>
@@ -11835,10 +11896,10 @@
       </p:pic>
       <p:pic>
         <p:nvPicPr>
-          <p:cNvPr id="3076" name="Picture 4">
+          <p:cNvPr id="2060" name="Picture 12">
             <a:extLst>
               <a:ext uri="{FF2B5EF4-FFF2-40B4-BE49-F238E27FC236}">
-                <a16:creationId xmlns:a16="http://schemas.microsoft.com/office/drawing/2014/main" id="{7A34F2BE-B235-A13C-DBD1-44F033D0ABC8}"/>
+                <a16:creationId xmlns:a16="http://schemas.microsoft.com/office/drawing/2014/main" id="{C410A8B4-16C9-9E79-48AD-F35F8FDBA02E}"/>
               </a:ext>
             </a:extLst>
           </p:cNvPr>
@@ -11862,7 +11923,7 @@
         </p:blipFill>
         <p:spPr bwMode="auto">
           <a:xfrm>
-            <a:off x="0" y="4555625"/>
+            <a:off x="4571999" y="2536371"/>
             <a:ext cx="4572000" cy="1785257"/>
           </a:xfrm>
           <a:prstGeom prst="rect">
@@ -11882,10 +11943,10 @@
       </p:pic>
       <p:pic>
         <p:nvPicPr>
-          <p:cNvPr id="3078" name="Picture 6">
+          <p:cNvPr id="2062" name="Picture 14">
             <a:extLst>
               <a:ext uri="{FF2B5EF4-FFF2-40B4-BE49-F238E27FC236}">
-                <a16:creationId xmlns:a16="http://schemas.microsoft.com/office/drawing/2014/main" id="{89CD4072-1A30-E975-B968-DE06D6205613}"/>
+                <a16:creationId xmlns:a16="http://schemas.microsoft.com/office/drawing/2014/main" id="{78A12C91-BA28-A943-C663-F48D71FBF6C2}"/>
               </a:ext>
             </a:extLst>
           </p:cNvPr>
@@ -11909,7 +11970,7 @@
         </p:blipFill>
         <p:spPr bwMode="auto">
           <a:xfrm>
-            <a:off x="4572000" y="2404106"/>
+            <a:off x="-1" y="4571094"/>
             <a:ext cx="4572000" cy="1785257"/>
           </a:xfrm>
           <a:prstGeom prst="rect">
@@ -11929,10 +11990,10 @@
       </p:pic>
       <p:pic>
         <p:nvPicPr>
-          <p:cNvPr id="3082" name="Picture 10">
+          <p:cNvPr id="2064" name="Picture 16">
             <a:extLst>
               <a:ext uri="{FF2B5EF4-FFF2-40B4-BE49-F238E27FC236}">
-                <a16:creationId xmlns:a16="http://schemas.microsoft.com/office/drawing/2014/main" id="{4A443D29-A4CC-A372-9C4D-0B48D11DF3AA}"/>
+                <a16:creationId xmlns:a16="http://schemas.microsoft.com/office/drawing/2014/main" id="{976AA6B3-5025-67B1-DF32-71E56CB0ECAC}"/>
               </a:ext>
             </a:extLst>
           </p:cNvPr>
@@ -11956,7 +12017,7 @@
         </p:blipFill>
         <p:spPr bwMode="auto">
           <a:xfrm>
-            <a:off x="4572000" y="4555625"/>
+            <a:off x="4572000" y="4571094"/>
             <a:ext cx="4572000" cy="1785257"/>
           </a:xfrm>
           <a:prstGeom prst="rect">
@@ -12151,53 +12212,6 @@
           </a:p>
         </p:txBody>
       </p:sp>
-      <p:pic>
-        <p:nvPicPr>
-          <p:cNvPr id="4098" name="Picture 2">
-            <a:extLst>
-              <a:ext uri="{FF2B5EF4-FFF2-40B4-BE49-F238E27FC236}">
-                <a16:creationId xmlns:a16="http://schemas.microsoft.com/office/drawing/2014/main" id="{BA14F903-4BF7-4FEC-BC1F-02BA0D72C1E1}"/>
-              </a:ext>
-            </a:extLst>
-          </p:cNvPr>
-          <p:cNvPicPr>
-            <a:picLocks noChangeAspect="1" noChangeArrowheads="1"/>
-          </p:cNvPicPr>
-          <p:nvPr/>
-        </p:nvPicPr>
-        <p:blipFill>
-          <a:blip r:embed="rId2">
-            <a:extLst>
-              <a:ext uri="{28A0092B-C50C-407E-A947-70E740481C1C}">
-                <a14:useLocalDpi xmlns:a14="http://schemas.microsoft.com/office/drawing/2010/main" val="0"/>
-              </a:ext>
-            </a:extLst>
-          </a:blip>
-          <a:srcRect/>
-          <a:stretch>
-            <a:fillRect/>
-          </a:stretch>
-        </p:blipFill>
-        <p:spPr bwMode="auto">
-          <a:xfrm>
-            <a:off x="914400" y="3320552"/>
-            <a:ext cx="7315200" cy="2856411"/>
-          </a:xfrm>
-          <a:prstGeom prst="rect">
-            <a:avLst/>
-          </a:prstGeom>
-          <a:noFill/>
-          <a:extLst>
-            <a:ext uri="{909E8E84-426E-40DD-AFC4-6F175D3DCCD1}">
-              <a14:hiddenFill xmlns:a14="http://schemas.microsoft.com/office/drawing/2010/main">
-                <a:solidFill>
-                  <a:srgbClr val="FFFFFF"/>
-                </a:solidFill>
-              </a14:hiddenFill>
-            </a:ext>
-          </a:extLst>
-        </p:spPr>
-      </p:pic>
       <p:sp>
         <p:nvSpPr>
           <p:cNvPr id="10" name="TextBox 9">
@@ -12247,7 +12261,7 @@
                   <a:srgbClr val="D64045"/>
                 </a:solidFill>
                 <a:latin typeface="Bahnschrift SemiLight" panose="020B0502040204020203" pitchFamily="34" charset="0"/>
-                <a:hlinkClick r:id="rId3">
+                <a:hlinkClick r:id="rId2">
                   <a:extLst>
                     <a:ext uri="{A12FA001-AC4F-418D-AE19-62706E023703}">
                       <ahyp:hlinkClr xmlns:ahyp="http://schemas.microsoft.com/office/drawing/2018/hyperlinkcolor" val="tx"/>
@@ -12255,7 +12269,16 @@
                   </a:extLst>
                 </a:hlinkClick>
               </a:rPr>
-              <a:t>https://giphy.com/gifs/python-tracking-video-processing-hJO3Sw9Hq0HOsO60TX/fullscreen</a:t>
+              <a:t>https://giphy.com/gifs/ZpCkOdFM9jun27ONXp/fullscreen</a:t>
+            </a:r>
+            <a:r>
+              <a:rPr lang="en-US" sz="1200" dirty="0">
+                <a:solidFill>
+                  <a:srgbClr val="D64045"/>
+                </a:solidFill>
+                <a:latin typeface="Bahnschrift SemiLight" panose="020B0502040204020203" pitchFamily="34" charset="0"/>
+              </a:rPr>
+              <a:t> </a:t>
             </a:r>
             <a:r>
               <a:rPr lang="en-US" sz="1200" dirty="0">
@@ -12274,6 +12297,92 @@
           </a:p>
         </p:txBody>
       </p:sp>
+      <p:pic>
+        <p:nvPicPr>
+          <p:cNvPr id="7" name="Picture 6" descr="A picture containing text, indoor&#10;&#10;Description automatically generated">
+            <a:extLst>
+              <a:ext uri="{FF2B5EF4-FFF2-40B4-BE49-F238E27FC236}">
+                <a16:creationId xmlns:a16="http://schemas.microsoft.com/office/drawing/2014/main" id="{467F0B04-C5C7-C6AE-E488-20464A127519}"/>
+              </a:ext>
+            </a:extLst>
+          </p:cNvPr>
+          <p:cNvPicPr>
+            <a:picLocks noChangeAspect="1"/>
+          </p:cNvPicPr>
+          <p:nvPr/>
+        </p:nvPicPr>
+        <p:blipFill>
+          <a:blip r:embed="rId3">
+            <a:extLst>
+              <a:ext uri="{BEBA8EAE-BF5A-486C-A8C5-ECC9F3942E4B}">
+                <a14:imgProps xmlns:a14="http://schemas.microsoft.com/office/drawing/2010/main">
+                  <a14:imgLayer r:embed="rId4">
+                    <a14:imgEffect>
+                      <a14:backgroundRemoval t="10000" b="90000" l="4267" r="93867">
+                        <a14:foregroundMark x1="16267" y1="50000" x2="26933" y2="59000"/>
+                        <a14:foregroundMark x1="8533" y1="10667" x2="22667" y2="15333"/>
+                        <a14:foregroundMark x1="22667" y1="15333" x2="33333" y2="27667"/>
+                        <a14:foregroundMark x1="33333" y1="27667" x2="32533" y2="61000"/>
+                        <a14:foregroundMark x1="32533" y1="61000" x2="20800" y2="74667"/>
+                        <a14:foregroundMark x1="20800" y1="74667" x2="14133" y2="44000"/>
+                        <a14:foregroundMark x1="14133" y1="44000" x2="16267" y2="33667"/>
+                        <a14:foregroundMark x1="7467" y1="33000" x2="5200" y2="78000"/>
+                        <a14:foregroundMark x1="5200" y1="78000" x2="5200" y2="78000"/>
+                        <a14:foregroundMark x1="66400" y1="30333" x2="70533" y2="54333"/>
+                        <a14:foregroundMark x1="58000" y1="75333" x2="64933" y2="47333"/>
+                        <a14:foregroundMark x1="64933" y1="47333" x2="82800" y2="11333"/>
+                        <a14:foregroundMark x1="82800" y1="11333" x2="84133" y2="13000"/>
+                        <a14:foregroundMark x1="91733" y1="14000" x2="89067" y2="41667"/>
+                        <a14:foregroundMark x1="89067" y1="41667" x2="73333" y2="74333"/>
+                        <a14:foregroundMark x1="73333" y1="74333" x2="67067" y2="73000"/>
+                        <a14:foregroundMark x1="59067" y1="20333" x2="76533" y2="25000"/>
+                        <a14:foregroundMark x1="56267" y1="16333" x2="58933" y2="53667"/>
+                        <a14:foregroundMark x1="58933" y1="53667" x2="58800" y2="55667"/>
+                        <a14:foregroundMark x1="56933" y1="82000" x2="72133" y2="75333"/>
+                        <a14:foregroundMark x1="70800" y1="85333" x2="86400" y2="77000"/>
+                        <a14:foregroundMark x1="93867" y1="77667" x2="83467" y2="87667"/>
+                        <a14:foregroundMark x1="43600" y1="68333" x2="34800" y2="78333"/>
+                        <a14:foregroundMark x1="45600" y1="24333" x2="32533" y2="63333"/>
+                        <a14:foregroundMark x1="32533" y1="63333" x2="32400" y2="64333"/>
+                        <a14:foregroundMark x1="42667" y1="17667" x2="13467" y2="24000"/>
+                        <a14:foregroundMark x1="13467" y1="24000" x2="12400" y2="25000"/>
+                        <a14:foregroundMark x1="43200" y1="37333" x2="39333" y2="83333"/>
+                        <a14:foregroundMark x1="47600" y1="12667" x2="46400" y2="36000"/>
+                        <a14:foregroundMark x1="47467" y1="61333" x2="47733" y2="12667"/>
+                        <a14:foregroundMark x1="47733" y1="12667" x2="47733" y2="12667"/>
+                        <a14:foregroundMark x1="47600" y1="36000" x2="47733" y2="36667"/>
+                        <a14:foregroundMark x1="47333" y1="39333" x2="47733" y2="40000"/>
+                        <a14:foregroundMark x1="47733" y1="42333" x2="48133" y2="41000"/>
+                        <a14:foregroundMark x1="48000" y1="58000" x2="47867" y2="49000"/>
+                        <a14:foregroundMark x1="47733" y1="13333" x2="48133" y2="35000"/>
+                        <a14:foregroundMark x1="48133" y1="35000" x2="47733" y2="38333"/>
+                        <a14:foregroundMark x1="47067" y1="13333" x2="45867" y2="47000"/>
+                        <a14:foregroundMark x1="13067" y1="31000" x2="9067" y2="17000"/>
+                        <a14:foregroundMark x1="5067" y1="11000" x2="4267" y2="49667"/>
+                      </a14:backgroundRemoval>
+                    </a14:imgEffect>
+                  </a14:imgLayer>
+                </a14:imgProps>
+              </a:ext>
+              <a:ext uri="{28A0092B-C50C-407E-A947-70E740481C1C}">
+                <a14:useLocalDpi xmlns:a14="http://schemas.microsoft.com/office/drawing/2010/main" val="0"/>
+              </a:ext>
+            </a:extLst>
+          </a:blip>
+          <a:stretch>
+            <a:fillRect/>
+          </a:stretch>
+        </p:blipFill>
+        <p:spPr>
+          <a:xfrm>
+            <a:off x="914400" y="3142165"/>
+            <a:ext cx="7315200" cy="2926081"/>
+          </a:xfrm>
+          <a:prstGeom prst="rect">
+            <a:avLst/>
+          </a:prstGeom>
+        </p:spPr>
+      </p:pic>
     </p:spTree>
     <p:extLst>
       <p:ext uri="{BB962C8B-B14F-4D97-AF65-F5344CB8AC3E}">

</xml_diff>

<commit_message>
Submitted Act 5/8 reports
</commit_message>
<xml_diff>
--- a/05 Video Processing/Activity 5 - Video Processing.pptx
+++ b/05 Video Processing/Activity 5 - Video Processing.pptx
@@ -2784,7 +2784,7 @@
           <a:p>
             <a:fld id="{5C1B11F4-4A81-4A1F-8746-8659FC968F94}" type="datetimeFigureOut">
               <a:rPr lang="en-US" smtClean="0"/>
-              <a:t>6/9/2022</a:t>
+              <a:t>6/10/2022</a:t>
             </a:fld>
             <a:endParaRPr lang="en-US"/>
           </a:p>
@@ -3196,9 +3196,9 @@
             <a:pPr algn="l"/>
             <a:r>
               <a:rPr lang="en-PH" sz="8000" spc="600" baseline="0" dirty="0">
-                <a:pattFill prst="dotGrid">
+                <a:pattFill prst="ltHorz">
                   <a:fgClr>
-                    <a:srgbClr val="FFEE9E"/>
+                    <a:srgbClr val="EBA0A2"/>
                   </a:fgClr>
                   <a:bgClr>
                     <a:srgbClr val="D64045"/>
@@ -10357,7 +10357,7 @@
                 </a:highlight>
                 <a:latin typeface="Bahnschrift SemiBold" panose="020B0502040204020203" pitchFamily="34" charset="0"/>
               </a:rPr>
-              <a:t>100/100.</a:t>
+              <a:t>98/100.</a:t>
             </a:r>
             <a:endParaRPr lang="en-US" sz="1400" dirty="0">
               <a:highlight>
@@ -11274,7 +11274,7 @@
           </a:bodyPr>
           <a:lstStyle/>
           <a:p>
-            <a:pPr marL="0" indent="457200">
+            <a:pPr marL="0" indent="0">
               <a:buNone/>
             </a:pPr>
             <a:r>

</xml_diff>